<commit_message>
Updated final submission items.
Everything should be ready…
</commit_message>
<xml_diff>
--- a/documentssssssssssyay!!!!!!!/Email Spam Filtering.pptx
+++ b/documentssssssssssyay!!!!!!!/Email Spam Filtering.pptx
@@ -60,7 +60,7 @@
       </p:grpSpPr>
       <p:sp>
         <p:nvSpPr>
-          <p:cNvPr id="27" name="PlaceHolder 1"/>
+          <p:cNvPr id="23" name="PlaceHolder 1"/>
           <p:cNvSpPr>
             <a:spLocks noGrp="1"/>
           </p:cNvSpPr>
@@ -70,8 +70,8 @@
         </p:nvSpPr>
         <p:spPr>
           <a:xfrm>
-            <a:off x="457200" y="274680"/>
-            <a:ext cx="8229240" cy="1142640"/>
+            <a:off x="457200" y="273600"/>
+            <a:ext cx="8229240" cy="1144800"/>
           </a:xfrm>
           <a:prstGeom prst="rect">
             <a:avLst/>
@@ -80,13 +80,14 @@
         <p:txBody>
           <a:bodyPr lIns="0" rIns="0" tIns="0" bIns="0" anchor="ctr"/>
           <a:p>
-            <a:endParaRPr/>
-          </a:p>
-        </p:txBody>
-      </p:sp>
-      <p:sp>
-        <p:nvSpPr>
-          <p:cNvPr id="28" name="PlaceHolder 2"/>
+            <a:pPr algn="ctr"/>
+            <a:endParaRPr/>
+          </a:p>
+        </p:txBody>
+      </p:sp>
+      <p:sp>
+        <p:nvSpPr>
+          <p:cNvPr id="24" name="PlaceHolder 2"/>
           <p:cNvSpPr>
             <a:spLocks noGrp="1"/>
           </p:cNvSpPr>
@@ -96,8 +97,8 @@
         </p:nvSpPr>
         <p:spPr>
           <a:xfrm>
-            <a:off x="457200" y="1600200"/>
-            <a:ext cx="8229240" cy="2246040"/>
+            <a:off x="457200" y="1604520"/>
+            <a:ext cx="8229240" cy="1896840"/>
           </a:xfrm>
           <a:prstGeom prst="rect">
             <a:avLst/>
@@ -112,7 +113,7 @@
       </p:sp>
       <p:sp>
         <p:nvSpPr>
-          <p:cNvPr id="29" name="PlaceHolder 3"/>
+          <p:cNvPr id="25" name="PlaceHolder 3"/>
           <p:cNvSpPr>
             <a:spLocks noGrp="1"/>
           </p:cNvSpPr>
@@ -122,8 +123,8 @@
         </p:nvSpPr>
         <p:spPr>
           <a:xfrm>
-            <a:off x="457200" y="4060080"/>
-            <a:ext cx="8229240" cy="2246040"/>
+            <a:off x="457200" y="3682080"/>
+            <a:ext cx="8229240" cy="1896840"/>
           </a:xfrm>
           <a:prstGeom prst="rect">
             <a:avLst/>
@@ -160,7 +161,7 @@
       </p:grpSpPr>
       <p:sp>
         <p:nvSpPr>
-          <p:cNvPr id="30" name="PlaceHolder 1"/>
+          <p:cNvPr id="26" name="PlaceHolder 1"/>
           <p:cNvSpPr>
             <a:spLocks noGrp="1"/>
           </p:cNvSpPr>
@@ -170,8 +171,8 @@
         </p:nvSpPr>
         <p:spPr>
           <a:xfrm>
-            <a:off x="457200" y="274680"/>
-            <a:ext cx="8229240" cy="1142640"/>
+            <a:off x="457200" y="273600"/>
+            <a:ext cx="8229240" cy="1144800"/>
           </a:xfrm>
           <a:prstGeom prst="rect">
             <a:avLst/>
@@ -180,13 +181,14 @@
         <p:txBody>
           <a:bodyPr lIns="0" rIns="0" tIns="0" bIns="0" anchor="ctr"/>
           <a:p>
-            <a:endParaRPr/>
-          </a:p>
-        </p:txBody>
-      </p:sp>
-      <p:sp>
-        <p:nvSpPr>
-          <p:cNvPr id="31" name="PlaceHolder 2"/>
+            <a:pPr algn="ctr"/>
+            <a:endParaRPr/>
+          </a:p>
+        </p:txBody>
+      </p:sp>
+      <p:sp>
+        <p:nvSpPr>
+          <p:cNvPr id="27" name="PlaceHolder 2"/>
           <p:cNvSpPr>
             <a:spLocks noGrp="1"/>
           </p:cNvSpPr>
@@ -196,8 +198,8 @@
         </p:nvSpPr>
         <p:spPr>
           <a:xfrm>
-            <a:off x="457200" y="1600200"/>
-            <a:ext cx="4015800" cy="2246040"/>
+            <a:off x="457200" y="1604520"/>
+            <a:ext cx="4015800" cy="1896840"/>
           </a:xfrm>
           <a:prstGeom prst="rect">
             <a:avLst/>
@@ -212,7 +214,7 @@
       </p:sp>
       <p:sp>
         <p:nvSpPr>
-          <p:cNvPr id="32" name="PlaceHolder 3"/>
+          <p:cNvPr id="28" name="PlaceHolder 3"/>
           <p:cNvSpPr>
             <a:spLocks noGrp="1"/>
           </p:cNvSpPr>
@@ -222,8 +224,8 @@
         </p:nvSpPr>
         <p:spPr>
           <a:xfrm>
-            <a:off x="4674240" y="1600200"/>
-            <a:ext cx="4015800" cy="2246040"/>
+            <a:off x="4674240" y="1604520"/>
+            <a:ext cx="4015800" cy="1896840"/>
           </a:xfrm>
           <a:prstGeom prst="rect">
             <a:avLst/>
@@ -238,7 +240,7 @@
       </p:sp>
       <p:sp>
         <p:nvSpPr>
-          <p:cNvPr id="33" name="PlaceHolder 4"/>
+          <p:cNvPr id="29" name="PlaceHolder 4"/>
           <p:cNvSpPr>
             <a:spLocks noGrp="1"/>
           </p:cNvSpPr>
@@ -248,8 +250,8 @@
         </p:nvSpPr>
         <p:spPr>
           <a:xfrm>
-            <a:off x="4674240" y="4060080"/>
-            <a:ext cx="4015800" cy="2246040"/>
+            <a:off x="4674240" y="3682080"/>
+            <a:ext cx="4015800" cy="1896840"/>
           </a:xfrm>
           <a:prstGeom prst="rect">
             <a:avLst/>
@@ -264,7 +266,7 @@
       </p:sp>
       <p:sp>
         <p:nvSpPr>
-          <p:cNvPr id="34" name="PlaceHolder 5"/>
+          <p:cNvPr id="30" name="PlaceHolder 5"/>
           <p:cNvSpPr>
             <a:spLocks noGrp="1"/>
           </p:cNvSpPr>
@@ -274,8 +276,8 @@
         </p:nvSpPr>
         <p:spPr>
           <a:xfrm>
-            <a:off x="457200" y="4060080"/>
-            <a:ext cx="4015800" cy="2246040"/>
+            <a:off x="457200" y="3682080"/>
+            <a:ext cx="4015800" cy="1896840"/>
           </a:xfrm>
           <a:prstGeom prst="rect">
             <a:avLst/>
@@ -312,7 +314,7 @@
       </p:grpSpPr>
       <p:sp>
         <p:nvSpPr>
-          <p:cNvPr id="35" name="PlaceHolder 1"/>
+          <p:cNvPr id="31" name="PlaceHolder 1"/>
           <p:cNvSpPr>
             <a:spLocks noGrp="1"/>
           </p:cNvSpPr>
@@ -322,8 +324,8 @@
         </p:nvSpPr>
         <p:spPr>
           <a:xfrm>
-            <a:off x="457200" y="274680"/>
-            <a:ext cx="8229240" cy="1142640"/>
+            <a:off x="457200" y="273600"/>
+            <a:ext cx="8229240" cy="1144800"/>
           </a:xfrm>
           <a:prstGeom prst="rect">
             <a:avLst/>
@@ -332,13 +334,14 @@
         <p:txBody>
           <a:bodyPr lIns="0" rIns="0" tIns="0" bIns="0" anchor="ctr"/>
           <a:p>
-            <a:endParaRPr/>
-          </a:p>
-        </p:txBody>
-      </p:sp>
-      <p:sp>
-        <p:nvSpPr>
-          <p:cNvPr id="36" name="PlaceHolder 2"/>
+            <a:pPr algn="ctr"/>
+            <a:endParaRPr/>
+          </a:p>
+        </p:txBody>
+      </p:sp>
+      <p:sp>
+        <p:nvSpPr>
+          <p:cNvPr id="32" name="PlaceHolder 2"/>
           <p:cNvSpPr>
             <a:spLocks noGrp="1"/>
           </p:cNvSpPr>
@@ -348,8 +351,8 @@
         </p:nvSpPr>
         <p:spPr>
           <a:xfrm>
-            <a:off x="457200" y="1600200"/>
-            <a:ext cx="8229240" cy="4708800"/>
+            <a:off x="457200" y="1604520"/>
+            <a:ext cx="8229240" cy="3977280"/>
           </a:xfrm>
           <a:prstGeom prst="rect">
             <a:avLst/>
@@ -364,7 +367,7 @@
       </p:sp>
       <p:sp>
         <p:nvSpPr>
-          <p:cNvPr id="37" name="PlaceHolder 3"/>
+          <p:cNvPr id="33" name="PlaceHolder 3"/>
           <p:cNvSpPr>
             <a:spLocks noGrp="1"/>
           </p:cNvSpPr>
@@ -374,8 +377,8 @@
         </p:nvSpPr>
         <p:spPr>
           <a:xfrm>
-            <a:off x="457200" y="1600200"/>
-            <a:ext cx="8229240" cy="4708800"/>
+            <a:off x="457200" y="1604520"/>
+            <a:ext cx="8229240" cy="3977280"/>
           </a:xfrm>
           <a:prstGeom prst="rect">
             <a:avLst/>
@@ -390,7 +393,7 @@
       </p:sp>
       <p:pic>
         <p:nvPicPr>
-          <p:cNvPr id="38" name="" descr=""/>
+          <p:cNvPr id="34" name="" descr=""/>
           <p:cNvPicPr/>
           <p:nvPr/>
         </p:nvPicPr>
@@ -400,8 +403,8 @@
         </p:blipFill>
         <p:spPr>
           <a:xfrm>
-            <a:off x="1620360" y="1600200"/>
-            <a:ext cx="5902200" cy="4708800"/>
+            <a:off x="2078280" y="1604520"/>
+            <a:ext cx="4986360" cy="3977280"/>
           </a:xfrm>
           <a:prstGeom prst="rect">
             <a:avLst/>
@@ -413,7 +416,7 @@
       </p:pic>
       <p:pic>
         <p:nvPicPr>
-          <p:cNvPr id="39" name="" descr=""/>
+          <p:cNvPr id="35" name="" descr=""/>
           <p:cNvPicPr/>
           <p:nvPr/>
         </p:nvPicPr>
@@ -423,8 +426,8 @@
         </p:blipFill>
         <p:spPr>
           <a:xfrm>
-            <a:off x="1620360" y="1600200"/>
-            <a:ext cx="5902200" cy="4708800"/>
+            <a:off x="2078280" y="1604520"/>
+            <a:ext cx="4986360" cy="3977280"/>
           </a:xfrm>
           <a:prstGeom prst="rect">
             <a:avLst/>
@@ -480,7 +483,7 @@
       </p:grpSpPr>
       <p:sp>
         <p:nvSpPr>
-          <p:cNvPr id="45" name="PlaceHolder 1"/>
+          <p:cNvPr id="38" name="PlaceHolder 1"/>
           <p:cNvSpPr>
             <a:spLocks noGrp="1"/>
           </p:cNvSpPr>
@@ -490,8 +493,8 @@
         </p:nvSpPr>
         <p:spPr>
           <a:xfrm>
-            <a:off x="457200" y="274680"/>
-            <a:ext cx="8229240" cy="1142640"/>
+            <a:off x="457200" y="273600"/>
+            <a:ext cx="8229240" cy="1144800"/>
           </a:xfrm>
           <a:prstGeom prst="rect">
             <a:avLst/>
@@ -500,13 +503,14 @@
         <p:txBody>
           <a:bodyPr lIns="0" rIns="0" tIns="0" bIns="0" anchor="ctr"/>
           <a:p>
-            <a:endParaRPr/>
-          </a:p>
-        </p:txBody>
-      </p:sp>
-      <p:sp>
-        <p:nvSpPr>
-          <p:cNvPr id="46" name="PlaceHolder 2"/>
+            <a:pPr algn="ctr"/>
+            <a:endParaRPr/>
+          </a:p>
+        </p:txBody>
+      </p:sp>
+      <p:sp>
+        <p:nvSpPr>
+          <p:cNvPr id="39" name="PlaceHolder 2"/>
           <p:cNvSpPr>
             <a:spLocks noGrp="1"/>
           </p:cNvSpPr>
@@ -516,8 +520,8 @@
         </p:nvSpPr>
         <p:spPr>
           <a:xfrm>
-            <a:off x="457200" y="1600200"/>
-            <a:ext cx="8229240" cy="4708800"/>
+            <a:off x="457200" y="1604520"/>
+            <a:ext cx="8229240" cy="3977280"/>
           </a:xfrm>
           <a:prstGeom prst="rect">
             <a:avLst/>
@@ -555,7 +559,7 @@
       </p:grpSpPr>
       <p:sp>
         <p:nvSpPr>
-          <p:cNvPr id="47" name="PlaceHolder 1"/>
+          <p:cNvPr id="40" name="PlaceHolder 1"/>
           <p:cNvSpPr>
             <a:spLocks noGrp="1"/>
           </p:cNvSpPr>
@@ -565,8 +569,8 @@
         </p:nvSpPr>
         <p:spPr>
           <a:xfrm>
-            <a:off x="457200" y="274680"/>
-            <a:ext cx="8229240" cy="1142640"/>
+            <a:off x="457200" y="273600"/>
+            <a:ext cx="8229240" cy="1144800"/>
           </a:xfrm>
           <a:prstGeom prst="rect">
             <a:avLst/>
@@ -575,13 +579,14 @@
         <p:txBody>
           <a:bodyPr lIns="0" rIns="0" tIns="0" bIns="0" anchor="ctr"/>
           <a:p>
-            <a:endParaRPr/>
-          </a:p>
-        </p:txBody>
-      </p:sp>
-      <p:sp>
-        <p:nvSpPr>
-          <p:cNvPr id="48" name="PlaceHolder 2"/>
+            <a:pPr algn="ctr"/>
+            <a:endParaRPr/>
+          </a:p>
+        </p:txBody>
+      </p:sp>
+      <p:sp>
+        <p:nvSpPr>
+          <p:cNvPr id="41" name="PlaceHolder 2"/>
           <p:cNvSpPr>
             <a:spLocks noGrp="1"/>
           </p:cNvSpPr>
@@ -591,8 +596,8 @@
         </p:nvSpPr>
         <p:spPr>
           <a:xfrm>
-            <a:off x="457200" y="1600200"/>
-            <a:ext cx="8229240" cy="4708800"/>
+            <a:off x="457200" y="1604520"/>
+            <a:ext cx="8229240" cy="3977280"/>
           </a:xfrm>
           <a:prstGeom prst="rect">
             <a:avLst/>
@@ -629,7 +634,7 @@
       </p:grpSpPr>
       <p:sp>
         <p:nvSpPr>
-          <p:cNvPr id="49" name="PlaceHolder 1"/>
+          <p:cNvPr id="42" name="PlaceHolder 1"/>
           <p:cNvSpPr>
             <a:spLocks noGrp="1"/>
           </p:cNvSpPr>
@@ -639,8 +644,8 @@
         </p:nvSpPr>
         <p:spPr>
           <a:xfrm>
-            <a:off x="457200" y="274680"/>
-            <a:ext cx="8229240" cy="1142640"/>
+            <a:off x="457200" y="273600"/>
+            <a:ext cx="8229240" cy="1144800"/>
           </a:xfrm>
           <a:prstGeom prst="rect">
             <a:avLst/>
@@ -649,13 +654,14 @@
         <p:txBody>
           <a:bodyPr lIns="0" rIns="0" tIns="0" bIns="0" anchor="ctr"/>
           <a:p>
-            <a:endParaRPr/>
-          </a:p>
-        </p:txBody>
-      </p:sp>
-      <p:sp>
-        <p:nvSpPr>
-          <p:cNvPr id="50" name="PlaceHolder 2"/>
+            <a:pPr algn="ctr"/>
+            <a:endParaRPr/>
+          </a:p>
+        </p:txBody>
+      </p:sp>
+      <p:sp>
+        <p:nvSpPr>
+          <p:cNvPr id="43" name="PlaceHolder 2"/>
           <p:cNvSpPr>
             <a:spLocks noGrp="1"/>
           </p:cNvSpPr>
@@ -665,8 +671,8 @@
         </p:nvSpPr>
         <p:spPr>
           <a:xfrm>
-            <a:off x="457200" y="1600200"/>
-            <a:ext cx="4015800" cy="4708800"/>
+            <a:off x="457200" y="1604520"/>
+            <a:ext cx="4015800" cy="3977280"/>
           </a:xfrm>
           <a:prstGeom prst="rect">
             <a:avLst/>
@@ -681,7 +687,7 @@
       </p:sp>
       <p:sp>
         <p:nvSpPr>
-          <p:cNvPr id="51" name="PlaceHolder 3"/>
+          <p:cNvPr id="44" name="PlaceHolder 3"/>
           <p:cNvSpPr>
             <a:spLocks noGrp="1"/>
           </p:cNvSpPr>
@@ -691,8 +697,8 @@
         </p:nvSpPr>
         <p:spPr>
           <a:xfrm>
-            <a:off x="4674240" y="1600200"/>
-            <a:ext cx="4015800" cy="4708800"/>
+            <a:off x="4674240" y="1604520"/>
+            <a:ext cx="4015800" cy="3977280"/>
           </a:xfrm>
           <a:prstGeom prst="rect">
             <a:avLst/>
@@ -729,7 +735,7 @@
       </p:grpSpPr>
       <p:sp>
         <p:nvSpPr>
-          <p:cNvPr id="52" name="PlaceHolder 1"/>
+          <p:cNvPr id="45" name="PlaceHolder 1"/>
           <p:cNvSpPr>
             <a:spLocks noGrp="1"/>
           </p:cNvSpPr>
@@ -739,8 +745,8 @@
         </p:nvSpPr>
         <p:spPr>
           <a:xfrm>
-            <a:off x="457200" y="274680"/>
-            <a:ext cx="8229240" cy="1142640"/>
+            <a:off x="457200" y="273600"/>
+            <a:ext cx="8229240" cy="1144800"/>
           </a:xfrm>
           <a:prstGeom prst="rect">
             <a:avLst/>
@@ -749,6 +755,7 @@
         <p:txBody>
           <a:bodyPr lIns="0" rIns="0" tIns="0" bIns="0" anchor="ctr"/>
           <a:p>
+            <a:pPr algn="ctr"/>
             <a:endParaRPr/>
           </a:p>
         </p:txBody>
@@ -777,7 +784,7 @@
       </p:grpSpPr>
       <p:sp>
         <p:nvSpPr>
-          <p:cNvPr id="53" name="PlaceHolder 1"/>
+          <p:cNvPr id="46" name="PlaceHolder 1"/>
           <p:cNvSpPr>
             <a:spLocks noGrp="1"/>
           </p:cNvSpPr>
@@ -787,8 +794,8 @@
         </p:nvSpPr>
         <p:spPr>
           <a:xfrm>
-            <a:off x="457200" y="274680"/>
-            <a:ext cx="8229240" cy="5297760"/>
+            <a:off x="457200" y="273600"/>
+            <a:ext cx="8229240" cy="5307840"/>
           </a:xfrm>
           <a:prstGeom prst="rect">
             <a:avLst/>
@@ -826,7 +833,7 @@
       </p:grpSpPr>
       <p:sp>
         <p:nvSpPr>
-          <p:cNvPr id="54" name="PlaceHolder 1"/>
+          <p:cNvPr id="47" name="PlaceHolder 1"/>
           <p:cNvSpPr>
             <a:spLocks noGrp="1"/>
           </p:cNvSpPr>
@@ -836,8 +843,8 @@
         </p:nvSpPr>
         <p:spPr>
           <a:xfrm>
-            <a:off x="457200" y="274680"/>
-            <a:ext cx="8229240" cy="1142640"/>
+            <a:off x="457200" y="273600"/>
+            <a:ext cx="8229240" cy="1144800"/>
           </a:xfrm>
           <a:prstGeom prst="rect">
             <a:avLst/>
@@ -846,13 +853,14 @@
         <p:txBody>
           <a:bodyPr lIns="0" rIns="0" tIns="0" bIns="0" anchor="ctr"/>
           <a:p>
-            <a:endParaRPr/>
-          </a:p>
-        </p:txBody>
-      </p:sp>
-      <p:sp>
-        <p:nvSpPr>
-          <p:cNvPr id="55" name="PlaceHolder 2"/>
+            <a:pPr algn="ctr"/>
+            <a:endParaRPr/>
+          </a:p>
+        </p:txBody>
+      </p:sp>
+      <p:sp>
+        <p:nvSpPr>
+          <p:cNvPr id="48" name="PlaceHolder 2"/>
           <p:cNvSpPr>
             <a:spLocks noGrp="1"/>
           </p:cNvSpPr>
@@ -862,8 +870,8 @@
         </p:nvSpPr>
         <p:spPr>
           <a:xfrm>
-            <a:off x="457200" y="1600200"/>
-            <a:ext cx="4015800" cy="2246040"/>
+            <a:off x="457200" y="1604520"/>
+            <a:ext cx="4015800" cy="1896840"/>
           </a:xfrm>
           <a:prstGeom prst="rect">
             <a:avLst/>
@@ -878,7 +886,7 @@
       </p:sp>
       <p:sp>
         <p:nvSpPr>
-          <p:cNvPr id="56" name="PlaceHolder 3"/>
+          <p:cNvPr id="49" name="PlaceHolder 3"/>
           <p:cNvSpPr>
             <a:spLocks noGrp="1"/>
           </p:cNvSpPr>
@@ -888,8 +896,8 @@
         </p:nvSpPr>
         <p:spPr>
           <a:xfrm>
-            <a:off x="457200" y="4060080"/>
-            <a:ext cx="4015800" cy="2246040"/>
+            <a:off x="457200" y="3682080"/>
+            <a:ext cx="4015800" cy="1896840"/>
           </a:xfrm>
           <a:prstGeom prst="rect">
             <a:avLst/>
@@ -904,7 +912,7 @@
       </p:sp>
       <p:sp>
         <p:nvSpPr>
-          <p:cNvPr id="57" name="PlaceHolder 4"/>
+          <p:cNvPr id="50" name="PlaceHolder 4"/>
           <p:cNvSpPr>
             <a:spLocks noGrp="1"/>
           </p:cNvSpPr>
@@ -914,8 +922,8 @@
         </p:nvSpPr>
         <p:spPr>
           <a:xfrm>
-            <a:off x="4674240" y="1600200"/>
-            <a:ext cx="4015800" cy="4708800"/>
+            <a:off x="4674240" y="1604520"/>
+            <a:ext cx="4015800" cy="3977280"/>
           </a:xfrm>
           <a:prstGeom prst="rect">
             <a:avLst/>
@@ -952,7 +960,7 @@
       </p:grpSpPr>
       <p:sp>
         <p:nvSpPr>
-          <p:cNvPr id="6" name="PlaceHolder 1"/>
+          <p:cNvPr id="2" name="PlaceHolder 1"/>
           <p:cNvSpPr>
             <a:spLocks noGrp="1"/>
           </p:cNvSpPr>
@@ -962,8 +970,8 @@
         </p:nvSpPr>
         <p:spPr>
           <a:xfrm>
-            <a:off x="457200" y="274680"/>
-            <a:ext cx="8229240" cy="1142640"/>
+            <a:off x="457200" y="273600"/>
+            <a:ext cx="8229240" cy="1144800"/>
           </a:xfrm>
           <a:prstGeom prst="rect">
             <a:avLst/>
@@ -972,13 +980,14 @@
         <p:txBody>
           <a:bodyPr lIns="0" rIns="0" tIns="0" bIns="0" anchor="ctr"/>
           <a:p>
-            <a:endParaRPr/>
-          </a:p>
-        </p:txBody>
-      </p:sp>
-      <p:sp>
-        <p:nvSpPr>
-          <p:cNvPr id="7" name="PlaceHolder 2"/>
+            <a:pPr algn="ctr"/>
+            <a:endParaRPr/>
+          </a:p>
+        </p:txBody>
+      </p:sp>
+      <p:sp>
+        <p:nvSpPr>
+          <p:cNvPr id="3" name="PlaceHolder 2"/>
           <p:cNvSpPr>
             <a:spLocks noGrp="1"/>
           </p:cNvSpPr>
@@ -988,8 +997,8 @@
         </p:nvSpPr>
         <p:spPr>
           <a:xfrm>
-            <a:off x="457200" y="1600200"/>
-            <a:ext cx="8229240" cy="4708800"/>
+            <a:off x="457200" y="1604520"/>
+            <a:ext cx="8229240" cy="3977280"/>
           </a:xfrm>
           <a:prstGeom prst="rect">
             <a:avLst/>
@@ -1027,7 +1036,7 @@
       </p:grpSpPr>
       <p:sp>
         <p:nvSpPr>
-          <p:cNvPr id="58" name="PlaceHolder 1"/>
+          <p:cNvPr id="51" name="PlaceHolder 1"/>
           <p:cNvSpPr>
             <a:spLocks noGrp="1"/>
           </p:cNvSpPr>
@@ -1037,8 +1046,8 @@
         </p:nvSpPr>
         <p:spPr>
           <a:xfrm>
-            <a:off x="457200" y="274680"/>
-            <a:ext cx="8229240" cy="1142640"/>
+            <a:off x="457200" y="273600"/>
+            <a:ext cx="8229240" cy="1144800"/>
           </a:xfrm>
           <a:prstGeom prst="rect">
             <a:avLst/>
@@ -1047,13 +1056,14 @@
         <p:txBody>
           <a:bodyPr lIns="0" rIns="0" tIns="0" bIns="0" anchor="ctr"/>
           <a:p>
-            <a:endParaRPr/>
-          </a:p>
-        </p:txBody>
-      </p:sp>
-      <p:sp>
-        <p:nvSpPr>
-          <p:cNvPr id="59" name="PlaceHolder 2"/>
+            <a:pPr algn="ctr"/>
+            <a:endParaRPr/>
+          </a:p>
+        </p:txBody>
+      </p:sp>
+      <p:sp>
+        <p:nvSpPr>
+          <p:cNvPr id="52" name="PlaceHolder 2"/>
           <p:cNvSpPr>
             <a:spLocks noGrp="1"/>
           </p:cNvSpPr>
@@ -1063,8 +1073,8 @@
         </p:nvSpPr>
         <p:spPr>
           <a:xfrm>
-            <a:off x="457200" y="1600200"/>
-            <a:ext cx="4015800" cy="4708800"/>
+            <a:off x="457200" y="1604520"/>
+            <a:ext cx="4015800" cy="3977280"/>
           </a:xfrm>
           <a:prstGeom prst="rect">
             <a:avLst/>
@@ -1079,7 +1089,7 @@
       </p:sp>
       <p:sp>
         <p:nvSpPr>
-          <p:cNvPr id="60" name="PlaceHolder 3"/>
+          <p:cNvPr id="53" name="PlaceHolder 3"/>
           <p:cNvSpPr>
             <a:spLocks noGrp="1"/>
           </p:cNvSpPr>
@@ -1089,8 +1099,8 @@
         </p:nvSpPr>
         <p:spPr>
           <a:xfrm>
-            <a:off x="4674240" y="1600200"/>
-            <a:ext cx="4015800" cy="2246040"/>
+            <a:off x="4674240" y="1604520"/>
+            <a:ext cx="4015800" cy="1896840"/>
           </a:xfrm>
           <a:prstGeom prst="rect">
             <a:avLst/>
@@ -1105,7 +1115,7 @@
       </p:sp>
       <p:sp>
         <p:nvSpPr>
-          <p:cNvPr id="61" name="PlaceHolder 4"/>
+          <p:cNvPr id="54" name="PlaceHolder 4"/>
           <p:cNvSpPr>
             <a:spLocks noGrp="1"/>
           </p:cNvSpPr>
@@ -1115,8 +1125,8 @@
         </p:nvSpPr>
         <p:spPr>
           <a:xfrm>
-            <a:off x="4674240" y="4060080"/>
-            <a:ext cx="4015800" cy="2246040"/>
+            <a:off x="4674240" y="3682080"/>
+            <a:ext cx="4015800" cy="1896840"/>
           </a:xfrm>
           <a:prstGeom prst="rect">
             <a:avLst/>
@@ -1153,7 +1163,7 @@
       </p:grpSpPr>
       <p:sp>
         <p:nvSpPr>
-          <p:cNvPr id="62" name="PlaceHolder 1"/>
+          <p:cNvPr id="55" name="PlaceHolder 1"/>
           <p:cNvSpPr>
             <a:spLocks noGrp="1"/>
           </p:cNvSpPr>
@@ -1163,8 +1173,8 @@
         </p:nvSpPr>
         <p:spPr>
           <a:xfrm>
-            <a:off x="457200" y="274680"/>
-            <a:ext cx="8229240" cy="1142640"/>
+            <a:off x="457200" y="273600"/>
+            <a:ext cx="8229240" cy="1144800"/>
           </a:xfrm>
           <a:prstGeom prst="rect">
             <a:avLst/>
@@ -1173,13 +1183,14 @@
         <p:txBody>
           <a:bodyPr lIns="0" rIns="0" tIns="0" bIns="0" anchor="ctr"/>
           <a:p>
-            <a:endParaRPr/>
-          </a:p>
-        </p:txBody>
-      </p:sp>
-      <p:sp>
-        <p:nvSpPr>
-          <p:cNvPr id="63" name="PlaceHolder 2"/>
+            <a:pPr algn="ctr"/>
+            <a:endParaRPr/>
+          </a:p>
+        </p:txBody>
+      </p:sp>
+      <p:sp>
+        <p:nvSpPr>
+          <p:cNvPr id="56" name="PlaceHolder 2"/>
           <p:cNvSpPr>
             <a:spLocks noGrp="1"/>
           </p:cNvSpPr>
@@ -1189,8 +1200,8 @@
         </p:nvSpPr>
         <p:spPr>
           <a:xfrm>
-            <a:off x="457200" y="1600200"/>
-            <a:ext cx="4015800" cy="2246040"/>
+            <a:off x="457200" y="1604520"/>
+            <a:ext cx="4015800" cy="1896840"/>
           </a:xfrm>
           <a:prstGeom prst="rect">
             <a:avLst/>
@@ -1205,7 +1216,7 @@
       </p:sp>
       <p:sp>
         <p:nvSpPr>
-          <p:cNvPr id="64" name="PlaceHolder 3"/>
+          <p:cNvPr id="57" name="PlaceHolder 3"/>
           <p:cNvSpPr>
             <a:spLocks noGrp="1"/>
           </p:cNvSpPr>
@@ -1215,8 +1226,8 @@
         </p:nvSpPr>
         <p:spPr>
           <a:xfrm>
-            <a:off x="4674240" y="1600200"/>
-            <a:ext cx="4015800" cy="2246040"/>
+            <a:off x="4674240" y="1604520"/>
+            <a:ext cx="4015800" cy="1896840"/>
           </a:xfrm>
           <a:prstGeom prst="rect">
             <a:avLst/>
@@ -1231,7 +1242,7 @@
       </p:sp>
       <p:sp>
         <p:nvSpPr>
-          <p:cNvPr id="65" name="PlaceHolder 4"/>
+          <p:cNvPr id="58" name="PlaceHolder 4"/>
           <p:cNvSpPr>
             <a:spLocks noGrp="1"/>
           </p:cNvSpPr>
@@ -1241,8 +1252,8 @@
         </p:nvSpPr>
         <p:spPr>
           <a:xfrm>
-            <a:off x="457200" y="4060080"/>
-            <a:ext cx="8229240" cy="2246040"/>
+            <a:off x="457200" y="3682080"/>
+            <a:ext cx="8229240" cy="1896840"/>
           </a:xfrm>
           <a:prstGeom prst="rect">
             <a:avLst/>
@@ -1279,7 +1290,7 @@
       </p:grpSpPr>
       <p:sp>
         <p:nvSpPr>
-          <p:cNvPr id="66" name="PlaceHolder 1"/>
+          <p:cNvPr id="59" name="PlaceHolder 1"/>
           <p:cNvSpPr>
             <a:spLocks noGrp="1"/>
           </p:cNvSpPr>
@@ -1289,8 +1300,8 @@
         </p:nvSpPr>
         <p:spPr>
           <a:xfrm>
-            <a:off x="457200" y="274680"/>
-            <a:ext cx="8229240" cy="1142640"/>
+            <a:off x="457200" y="273600"/>
+            <a:ext cx="8229240" cy="1144800"/>
           </a:xfrm>
           <a:prstGeom prst="rect">
             <a:avLst/>
@@ -1299,13 +1310,14 @@
         <p:txBody>
           <a:bodyPr lIns="0" rIns="0" tIns="0" bIns="0" anchor="ctr"/>
           <a:p>
-            <a:endParaRPr/>
-          </a:p>
-        </p:txBody>
-      </p:sp>
-      <p:sp>
-        <p:nvSpPr>
-          <p:cNvPr id="67" name="PlaceHolder 2"/>
+            <a:pPr algn="ctr"/>
+            <a:endParaRPr/>
+          </a:p>
+        </p:txBody>
+      </p:sp>
+      <p:sp>
+        <p:nvSpPr>
+          <p:cNvPr id="60" name="PlaceHolder 2"/>
           <p:cNvSpPr>
             <a:spLocks noGrp="1"/>
           </p:cNvSpPr>
@@ -1315,8 +1327,8 @@
         </p:nvSpPr>
         <p:spPr>
           <a:xfrm>
-            <a:off x="457200" y="1600200"/>
-            <a:ext cx="8229240" cy="2246040"/>
+            <a:off x="457200" y="1604520"/>
+            <a:ext cx="8229240" cy="1896840"/>
           </a:xfrm>
           <a:prstGeom prst="rect">
             <a:avLst/>
@@ -1331,7 +1343,7 @@
       </p:sp>
       <p:sp>
         <p:nvSpPr>
-          <p:cNvPr id="68" name="PlaceHolder 3"/>
+          <p:cNvPr id="61" name="PlaceHolder 3"/>
           <p:cNvSpPr>
             <a:spLocks noGrp="1"/>
           </p:cNvSpPr>
@@ -1341,8 +1353,8 @@
         </p:nvSpPr>
         <p:spPr>
           <a:xfrm>
-            <a:off x="457200" y="4060080"/>
-            <a:ext cx="8229240" cy="2246040"/>
+            <a:off x="457200" y="3682080"/>
+            <a:ext cx="8229240" cy="1896840"/>
           </a:xfrm>
           <a:prstGeom prst="rect">
             <a:avLst/>
@@ -1379,7 +1391,7 @@
       </p:grpSpPr>
       <p:sp>
         <p:nvSpPr>
-          <p:cNvPr id="69" name="PlaceHolder 1"/>
+          <p:cNvPr id="62" name="PlaceHolder 1"/>
           <p:cNvSpPr>
             <a:spLocks noGrp="1"/>
           </p:cNvSpPr>
@@ -1389,8 +1401,8 @@
         </p:nvSpPr>
         <p:spPr>
           <a:xfrm>
-            <a:off x="457200" y="274680"/>
-            <a:ext cx="8229240" cy="1142640"/>
+            <a:off x="457200" y="273600"/>
+            <a:ext cx="8229240" cy="1144800"/>
           </a:xfrm>
           <a:prstGeom prst="rect">
             <a:avLst/>
@@ -1399,13 +1411,14 @@
         <p:txBody>
           <a:bodyPr lIns="0" rIns="0" tIns="0" bIns="0" anchor="ctr"/>
           <a:p>
-            <a:endParaRPr/>
-          </a:p>
-        </p:txBody>
-      </p:sp>
-      <p:sp>
-        <p:nvSpPr>
-          <p:cNvPr id="70" name="PlaceHolder 2"/>
+            <a:pPr algn="ctr"/>
+            <a:endParaRPr/>
+          </a:p>
+        </p:txBody>
+      </p:sp>
+      <p:sp>
+        <p:nvSpPr>
+          <p:cNvPr id="63" name="PlaceHolder 2"/>
           <p:cNvSpPr>
             <a:spLocks noGrp="1"/>
           </p:cNvSpPr>
@@ -1415,8 +1428,8 @@
         </p:nvSpPr>
         <p:spPr>
           <a:xfrm>
-            <a:off x="457200" y="1600200"/>
-            <a:ext cx="4015800" cy="2246040"/>
+            <a:off x="457200" y="1604520"/>
+            <a:ext cx="4015800" cy="1896840"/>
           </a:xfrm>
           <a:prstGeom prst="rect">
             <a:avLst/>
@@ -1431,7 +1444,7 @@
       </p:sp>
       <p:sp>
         <p:nvSpPr>
-          <p:cNvPr id="71" name="PlaceHolder 3"/>
+          <p:cNvPr id="64" name="PlaceHolder 3"/>
           <p:cNvSpPr>
             <a:spLocks noGrp="1"/>
           </p:cNvSpPr>
@@ -1441,8 +1454,8 @@
         </p:nvSpPr>
         <p:spPr>
           <a:xfrm>
-            <a:off x="4674240" y="1600200"/>
-            <a:ext cx="4015800" cy="2246040"/>
+            <a:off x="4674240" y="1604520"/>
+            <a:ext cx="4015800" cy="1896840"/>
           </a:xfrm>
           <a:prstGeom prst="rect">
             <a:avLst/>
@@ -1457,7 +1470,7 @@
       </p:sp>
       <p:sp>
         <p:nvSpPr>
-          <p:cNvPr id="72" name="PlaceHolder 4"/>
+          <p:cNvPr id="65" name="PlaceHolder 4"/>
           <p:cNvSpPr>
             <a:spLocks noGrp="1"/>
           </p:cNvSpPr>
@@ -1467,8 +1480,8 @@
         </p:nvSpPr>
         <p:spPr>
           <a:xfrm>
-            <a:off x="4674240" y="4060080"/>
-            <a:ext cx="4015800" cy="2246040"/>
+            <a:off x="4674240" y="3682080"/>
+            <a:ext cx="4015800" cy="1896840"/>
           </a:xfrm>
           <a:prstGeom prst="rect">
             <a:avLst/>
@@ -1483,7 +1496,7 @@
       </p:sp>
       <p:sp>
         <p:nvSpPr>
-          <p:cNvPr id="73" name="PlaceHolder 5"/>
+          <p:cNvPr id="66" name="PlaceHolder 5"/>
           <p:cNvSpPr>
             <a:spLocks noGrp="1"/>
           </p:cNvSpPr>
@@ -1493,8 +1506,8 @@
         </p:nvSpPr>
         <p:spPr>
           <a:xfrm>
-            <a:off x="457200" y="4060080"/>
-            <a:ext cx="4015800" cy="2246040"/>
+            <a:off x="457200" y="3682080"/>
+            <a:ext cx="4015800" cy="1896840"/>
           </a:xfrm>
           <a:prstGeom prst="rect">
             <a:avLst/>
@@ -1531,7 +1544,7 @@
       </p:grpSpPr>
       <p:sp>
         <p:nvSpPr>
-          <p:cNvPr id="74" name="PlaceHolder 1"/>
+          <p:cNvPr id="67" name="PlaceHolder 1"/>
           <p:cNvSpPr>
             <a:spLocks noGrp="1"/>
           </p:cNvSpPr>
@@ -1541,8 +1554,8 @@
         </p:nvSpPr>
         <p:spPr>
           <a:xfrm>
-            <a:off x="457200" y="274680"/>
-            <a:ext cx="8229240" cy="1142640"/>
+            <a:off x="457200" y="273600"/>
+            <a:ext cx="8229240" cy="1144800"/>
           </a:xfrm>
           <a:prstGeom prst="rect">
             <a:avLst/>
@@ -1551,13 +1564,14 @@
         <p:txBody>
           <a:bodyPr lIns="0" rIns="0" tIns="0" bIns="0" anchor="ctr"/>
           <a:p>
-            <a:endParaRPr/>
-          </a:p>
-        </p:txBody>
-      </p:sp>
-      <p:sp>
-        <p:nvSpPr>
-          <p:cNvPr id="75" name="PlaceHolder 2"/>
+            <a:pPr algn="ctr"/>
+            <a:endParaRPr/>
+          </a:p>
+        </p:txBody>
+      </p:sp>
+      <p:sp>
+        <p:nvSpPr>
+          <p:cNvPr id="68" name="PlaceHolder 2"/>
           <p:cNvSpPr>
             <a:spLocks noGrp="1"/>
           </p:cNvSpPr>
@@ -1567,8 +1581,8 @@
         </p:nvSpPr>
         <p:spPr>
           <a:xfrm>
-            <a:off x="457200" y="1600200"/>
-            <a:ext cx="8229240" cy="4708800"/>
+            <a:off x="457200" y="1604520"/>
+            <a:ext cx="8229240" cy="3977280"/>
           </a:xfrm>
           <a:prstGeom prst="rect">
             <a:avLst/>
@@ -1583,7 +1597,7 @@
       </p:sp>
       <p:sp>
         <p:nvSpPr>
-          <p:cNvPr id="76" name="PlaceHolder 3"/>
+          <p:cNvPr id="69" name="PlaceHolder 3"/>
           <p:cNvSpPr>
             <a:spLocks noGrp="1"/>
           </p:cNvSpPr>
@@ -1593,8 +1607,8 @@
         </p:nvSpPr>
         <p:spPr>
           <a:xfrm>
-            <a:off x="457200" y="1600200"/>
-            <a:ext cx="8229240" cy="4708800"/>
+            <a:off x="457200" y="1604520"/>
+            <a:ext cx="8229240" cy="3977280"/>
           </a:xfrm>
           <a:prstGeom prst="rect">
             <a:avLst/>
@@ -1609,7 +1623,7 @@
       </p:sp>
       <p:pic>
         <p:nvPicPr>
-          <p:cNvPr id="77" name="" descr=""/>
+          <p:cNvPr id="70" name="" descr=""/>
           <p:cNvPicPr/>
           <p:nvPr/>
         </p:nvPicPr>
@@ -1619,8 +1633,8 @@
         </p:blipFill>
         <p:spPr>
           <a:xfrm>
-            <a:off x="1620360" y="1600200"/>
-            <a:ext cx="5902200" cy="4708800"/>
+            <a:off x="2078280" y="1604520"/>
+            <a:ext cx="4986360" cy="3977280"/>
           </a:xfrm>
           <a:prstGeom prst="rect">
             <a:avLst/>
@@ -1632,7 +1646,7 @@
       </p:pic>
       <p:pic>
         <p:nvPicPr>
-          <p:cNvPr id="78" name="" descr=""/>
+          <p:cNvPr id="71" name="" descr=""/>
           <p:cNvPicPr/>
           <p:nvPr/>
         </p:nvPicPr>
@@ -1642,8 +1656,8 @@
         </p:blipFill>
         <p:spPr>
           <a:xfrm>
-            <a:off x="1620360" y="1600200"/>
-            <a:ext cx="5902200" cy="4708800"/>
+            <a:off x="2078280" y="1604520"/>
+            <a:ext cx="4986360" cy="3977280"/>
           </a:xfrm>
           <a:prstGeom prst="rect">
             <a:avLst/>
@@ -1677,7 +1691,7 @@
       </p:grpSpPr>
       <p:sp>
         <p:nvSpPr>
-          <p:cNvPr id="8" name="PlaceHolder 1"/>
+          <p:cNvPr id="4" name="PlaceHolder 1"/>
           <p:cNvSpPr>
             <a:spLocks noGrp="1"/>
           </p:cNvSpPr>
@@ -1687,8 +1701,8 @@
         </p:nvSpPr>
         <p:spPr>
           <a:xfrm>
-            <a:off x="457200" y="274680"/>
-            <a:ext cx="8229240" cy="1142640"/>
+            <a:off x="457200" y="273600"/>
+            <a:ext cx="8229240" cy="1144800"/>
           </a:xfrm>
           <a:prstGeom prst="rect">
             <a:avLst/>
@@ -1697,13 +1711,14 @@
         <p:txBody>
           <a:bodyPr lIns="0" rIns="0" tIns="0" bIns="0" anchor="ctr"/>
           <a:p>
-            <a:endParaRPr/>
-          </a:p>
-        </p:txBody>
-      </p:sp>
-      <p:sp>
-        <p:nvSpPr>
-          <p:cNvPr id="9" name="PlaceHolder 2"/>
+            <a:pPr algn="ctr"/>
+            <a:endParaRPr/>
+          </a:p>
+        </p:txBody>
+      </p:sp>
+      <p:sp>
+        <p:nvSpPr>
+          <p:cNvPr id="5" name="PlaceHolder 2"/>
           <p:cNvSpPr>
             <a:spLocks noGrp="1"/>
           </p:cNvSpPr>
@@ -1713,8 +1728,8 @@
         </p:nvSpPr>
         <p:spPr>
           <a:xfrm>
-            <a:off x="457200" y="1600200"/>
-            <a:ext cx="8229240" cy="4708800"/>
+            <a:off x="457200" y="1604520"/>
+            <a:ext cx="8229240" cy="3977280"/>
           </a:xfrm>
           <a:prstGeom prst="rect">
             <a:avLst/>
@@ -1751,7 +1766,7 @@
       </p:grpSpPr>
       <p:sp>
         <p:nvSpPr>
-          <p:cNvPr id="10" name="PlaceHolder 1"/>
+          <p:cNvPr id="6" name="PlaceHolder 1"/>
           <p:cNvSpPr>
             <a:spLocks noGrp="1"/>
           </p:cNvSpPr>
@@ -1761,8 +1776,8 @@
         </p:nvSpPr>
         <p:spPr>
           <a:xfrm>
-            <a:off x="457200" y="274680"/>
-            <a:ext cx="8229240" cy="1142640"/>
+            <a:off x="457200" y="273600"/>
+            <a:ext cx="8229240" cy="1144800"/>
           </a:xfrm>
           <a:prstGeom prst="rect">
             <a:avLst/>
@@ -1771,13 +1786,14 @@
         <p:txBody>
           <a:bodyPr lIns="0" rIns="0" tIns="0" bIns="0" anchor="ctr"/>
           <a:p>
-            <a:endParaRPr/>
-          </a:p>
-        </p:txBody>
-      </p:sp>
-      <p:sp>
-        <p:nvSpPr>
-          <p:cNvPr id="11" name="PlaceHolder 2"/>
+            <a:pPr algn="ctr"/>
+            <a:endParaRPr/>
+          </a:p>
+        </p:txBody>
+      </p:sp>
+      <p:sp>
+        <p:nvSpPr>
+          <p:cNvPr id="7" name="PlaceHolder 2"/>
           <p:cNvSpPr>
             <a:spLocks noGrp="1"/>
           </p:cNvSpPr>
@@ -1787,8 +1803,8 @@
         </p:nvSpPr>
         <p:spPr>
           <a:xfrm>
-            <a:off x="457200" y="1600200"/>
-            <a:ext cx="4015800" cy="4708800"/>
+            <a:off x="457200" y="1604520"/>
+            <a:ext cx="4015800" cy="3977280"/>
           </a:xfrm>
           <a:prstGeom prst="rect">
             <a:avLst/>
@@ -1803,7 +1819,7 @@
       </p:sp>
       <p:sp>
         <p:nvSpPr>
-          <p:cNvPr id="12" name="PlaceHolder 3"/>
+          <p:cNvPr id="8" name="PlaceHolder 3"/>
           <p:cNvSpPr>
             <a:spLocks noGrp="1"/>
           </p:cNvSpPr>
@@ -1813,8 +1829,8 @@
         </p:nvSpPr>
         <p:spPr>
           <a:xfrm>
-            <a:off x="4674240" y="1600200"/>
-            <a:ext cx="4015800" cy="4708800"/>
+            <a:off x="4674240" y="1604520"/>
+            <a:ext cx="4015800" cy="3977280"/>
           </a:xfrm>
           <a:prstGeom prst="rect">
             <a:avLst/>
@@ -1851,7 +1867,7 @@
       </p:grpSpPr>
       <p:sp>
         <p:nvSpPr>
-          <p:cNvPr id="13" name="PlaceHolder 1"/>
+          <p:cNvPr id="9" name="PlaceHolder 1"/>
           <p:cNvSpPr>
             <a:spLocks noGrp="1"/>
           </p:cNvSpPr>
@@ -1861,8 +1877,8 @@
         </p:nvSpPr>
         <p:spPr>
           <a:xfrm>
-            <a:off x="457200" y="274680"/>
-            <a:ext cx="8229240" cy="1142640"/>
+            <a:off x="457200" y="273600"/>
+            <a:ext cx="8229240" cy="1144800"/>
           </a:xfrm>
           <a:prstGeom prst="rect">
             <a:avLst/>
@@ -1871,6 +1887,7 @@
         <p:txBody>
           <a:bodyPr lIns="0" rIns="0" tIns="0" bIns="0" anchor="ctr"/>
           <a:p>
+            <a:pPr algn="ctr"/>
             <a:endParaRPr/>
           </a:p>
         </p:txBody>
@@ -1899,7 +1916,7 @@
       </p:grpSpPr>
       <p:sp>
         <p:nvSpPr>
-          <p:cNvPr id="14" name="PlaceHolder 1"/>
+          <p:cNvPr id="10" name="PlaceHolder 1"/>
           <p:cNvSpPr>
             <a:spLocks noGrp="1"/>
           </p:cNvSpPr>
@@ -1909,8 +1926,8 @@
         </p:nvSpPr>
         <p:spPr>
           <a:xfrm>
-            <a:off x="457200" y="274680"/>
-            <a:ext cx="8229240" cy="5297760"/>
+            <a:off x="457200" y="273600"/>
+            <a:ext cx="8229240" cy="5307840"/>
           </a:xfrm>
           <a:prstGeom prst="rect">
             <a:avLst/>
@@ -1948,7 +1965,7 @@
       </p:grpSpPr>
       <p:sp>
         <p:nvSpPr>
-          <p:cNvPr id="15" name="PlaceHolder 1"/>
+          <p:cNvPr id="11" name="PlaceHolder 1"/>
           <p:cNvSpPr>
             <a:spLocks noGrp="1"/>
           </p:cNvSpPr>
@@ -1958,8 +1975,8 @@
         </p:nvSpPr>
         <p:spPr>
           <a:xfrm>
-            <a:off x="457200" y="274680"/>
-            <a:ext cx="8229240" cy="1142640"/>
+            <a:off x="457200" y="273600"/>
+            <a:ext cx="8229240" cy="1144800"/>
           </a:xfrm>
           <a:prstGeom prst="rect">
             <a:avLst/>
@@ -1968,13 +1985,14 @@
         <p:txBody>
           <a:bodyPr lIns="0" rIns="0" tIns="0" bIns="0" anchor="ctr"/>
           <a:p>
-            <a:endParaRPr/>
-          </a:p>
-        </p:txBody>
-      </p:sp>
-      <p:sp>
-        <p:nvSpPr>
-          <p:cNvPr id="16" name="PlaceHolder 2"/>
+            <a:pPr algn="ctr"/>
+            <a:endParaRPr/>
+          </a:p>
+        </p:txBody>
+      </p:sp>
+      <p:sp>
+        <p:nvSpPr>
+          <p:cNvPr id="12" name="PlaceHolder 2"/>
           <p:cNvSpPr>
             <a:spLocks noGrp="1"/>
           </p:cNvSpPr>
@@ -1984,8 +2002,8 @@
         </p:nvSpPr>
         <p:spPr>
           <a:xfrm>
-            <a:off x="457200" y="1600200"/>
-            <a:ext cx="4015800" cy="2246040"/>
+            <a:off x="457200" y="1604520"/>
+            <a:ext cx="4015800" cy="1896840"/>
           </a:xfrm>
           <a:prstGeom prst="rect">
             <a:avLst/>
@@ -2000,7 +2018,7 @@
       </p:sp>
       <p:sp>
         <p:nvSpPr>
-          <p:cNvPr id="17" name="PlaceHolder 3"/>
+          <p:cNvPr id="13" name="PlaceHolder 3"/>
           <p:cNvSpPr>
             <a:spLocks noGrp="1"/>
           </p:cNvSpPr>
@@ -2010,8 +2028,8 @@
         </p:nvSpPr>
         <p:spPr>
           <a:xfrm>
-            <a:off x="457200" y="4060080"/>
-            <a:ext cx="4015800" cy="2246040"/>
+            <a:off x="457200" y="3682080"/>
+            <a:ext cx="4015800" cy="1896840"/>
           </a:xfrm>
           <a:prstGeom prst="rect">
             <a:avLst/>
@@ -2026,7 +2044,7 @@
       </p:sp>
       <p:sp>
         <p:nvSpPr>
-          <p:cNvPr id="18" name="PlaceHolder 4"/>
+          <p:cNvPr id="14" name="PlaceHolder 4"/>
           <p:cNvSpPr>
             <a:spLocks noGrp="1"/>
           </p:cNvSpPr>
@@ -2036,8 +2054,8 @@
         </p:nvSpPr>
         <p:spPr>
           <a:xfrm>
-            <a:off x="4674240" y="1600200"/>
-            <a:ext cx="4015800" cy="4708800"/>
+            <a:off x="4674240" y="1604520"/>
+            <a:ext cx="4015800" cy="3977280"/>
           </a:xfrm>
           <a:prstGeom prst="rect">
             <a:avLst/>
@@ -2074,7 +2092,7 @@
       </p:grpSpPr>
       <p:sp>
         <p:nvSpPr>
-          <p:cNvPr id="19" name="PlaceHolder 1"/>
+          <p:cNvPr id="15" name="PlaceHolder 1"/>
           <p:cNvSpPr>
             <a:spLocks noGrp="1"/>
           </p:cNvSpPr>
@@ -2084,8 +2102,8 @@
         </p:nvSpPr>
         <p:spPr>
           <a:xfrm>
-            <a:off x="457200" y="274680"/>
-            <a:ext cx="8229240" cy="1142640"/>
+            <a:off x="457200" y="273600"/>
+            <a:ext cx="8229240" cy="1144800"/>
           </a:xfrm>
           <a:prstGeom prst="rect">
             <a:avLst/>
@@ -2094,13 +2112,14 @@
         <p:txBody>
           <a:bodyPr lIns="0" rIns="0" tIns="0" bIns="0" anchor="ctr"/>
           <a:p>
-            <a:endParaRPr/>
-          </a:p>
-        </p:txBody>
-      </p:sp>
-      <p:sp>
-        <p:nvSpPr>
-          <p:cNvPr id="20" name="PlaceHolder 2"/>
+            <a:pPr algn="ctr"/>
+            <a:endParaRPr/>
+          </a:p>
+        </p:txBody>
+      </p:sp>
+      <p:sp>
+        <p:nvSpPr>
+          <p:cNvPr id="16" name="PlaceHolder 2"/>
           <p:cNvSpPr>
             <a:spLocks noGrp="1"/>
           </p:cNvSpPr>
@@ -2110,8 +2129,8 @@
         </p:nvSpPr>
         <p:spPr>
           <a:xfrm>
-            <a:off x="457200" y="1600200"/>
-            <a:ext cx="4015800" cy="4708800"/>
+            <a:off x="457200" y="1604520"/>
+            <a:ext cx="4015800" cy="3977280"/>
           </a:xfrm>
           <a:prstGeom prst="rect">
             <a:avLst/>
@@ -2126,7 +2145,7 @@
       </p:sp>
       <p:sp>
         <p:nvSpPr>
-          <p:cNvPr id="21" name="PlaceHolder 3"/>
+          <p:cNvPr id="17" name="PlaceHolder 3"/>
           <p:cNvSpPr>
             <a:spLocks noGrp="1"/>
           </p:cNvSpPr>
@@ -2136,8 +2155,8 @@
         </p:nvSpPr>
         <p:spPr>
           <a:xfrm>
-            <a:off x="4674240" y="1600200"/>
-            <a:ext cx="4015800" cy="2246040"/>
+            <a:off x="4674240" y="1604520"/>
+            <a:ext cx="4015800" cy="1896840"/>
           </a:xfrm>
           <a:prstGeom prst="rect">
             <a:avLst/>
@@ -2152,7 +2171,7 @@
       </p:sp>
       <p:sp>
         <p:nvSpPr>
-          <p:cNvPr id="22" name="PlaceHolder 4"/>
+          <p:cNvPr id="18" name="PlaceHolder 4"/>
           <p:cNvSpPr>
             <a:spLocks noGrp="1"/>
           </p:cNvSpPr>
@@ -2162,8 +2181,8 @@
         </p:nvSpPr>
         <p:spPr>
           <a:xfrm>
-            <a:off x="4674240" y="4060080"/>
-            <a:ext cx="4015800" cy="2246040"/>
+            <a:off x="4674240" y="3682080"/>
+            <a:ext cx="4015800" cy="1896840"/>
           </a:xfrm>
           <a:prstGeom prst="rect">
             <a:avLst/>
@@ -2200,7 +2219,7 @@
       </p:grpSpPr>
       <p:sp>
         <p:nvSpPr>
-          <p:cNvPr id="23" name="PlaceHolder 1"/>
+          <p:cNvPr id="19" name="PlaceHolder 1"/>
           <p:cNvSpPr>
             <a:spLocks noGrp="1"/>
           </p:cNvSpPr>
@@ -2210,8 +2229,8 @@
         </p:nvSpPr>
         <p:spPr>
           <a:xfrm>
-            <a:off x="457200" y="274680"/>
-            <a:ext cx="8229240" cy="1142640"/>
+            <a:off x="457200" y="273600"/>
+            <a:ext cx="8229240" cy="1144800"/>
           </a:xfrm>
           <a:prstGeom prst="rect">
             <a:avLst/>
@@ -2220,13 +2239,14 @@
         <p:txBody>
           <a:bodyPr lIns="0" rIns="0" tIns="0" bIns="0" anchor="ctr"/>
           <a:p>
-            <a:endParaRPr/>
-          </a:p>
-        </p:txBody>
-      </p:sp>
-      <p:sp>
-        <p:nvSpPr>
-          <p:cNvPr id="24" name="PlaceHolder 2"/>
+            <a:pPr algn="ctr"/>
+            <a:endParaRPr/>
+          </a:p>
+        </p:txBody>
+      </p:sp>
+      <p:sp>
+        <p:nvSpPr>
+          <p:cNvPr id="20" name="PlaceHolder 2"/>
           <p:cNvSpPr>
             <a:spLocks noGrp="1"/>
           </p:cNvSpPr>
@@ -2236,8 +2256,8 @@
         </p:nvSpPr>
         <p:spPr>
           <a:xfrm>
-            <a:off x="457200" y="1600200"/>
-            <a:ext cx="4015800" cy="2246040"/>
+            <a:off x="457200" y="1604520"/>
+            <a:ext cx="4015800" cy="1896840"/>
           </a:xfrm>
           <a:prstGeom prst="rect">
             <a:avLst/>
@@ -2252,7 +2272,7 @@
       </p:sp>
       <p:sp>
         <p:nvSpPr>
-          <p:cNvPr id="25" name="PlaceHolder 3"/>
+          <p:cNvPr id="21" name="PlaceHolder 3"/>
           <p:cNvSpPr>
             <a:spLocks noGrp="1"/>
           </p:cNvSpPr>
@@ -2262,8 +2282,8 @@
         </p:nvSpPr>
         <p:spPr>
           <a:xfrm>
-            <a:off x="4674240" y="1600200"/>
-            <a:ext cx="4015800" cy="2246040"/>
+            <a:off x="4674240" y="1604520"/>
+            <a:ext cx="4015800" cy="1896840"/>
           </a:xfrm>
           <a:prstGeom prst="rect">
             <a:avLst/>
@@ -2278,7 +2298,7 @@
       </p:sp>
       <p:sp>
         <p:nvSpPr>
-          <p:cNvPr id="26" name="PlaceHolder 4"/>
+          <p:cNvPr id="22" name="PlaceHolder 4"/>
           <p:cNvSpPr>
             <a:spLocks noGrp="1"/>
           </p:cNvSpPr>
@@ -2288,8 +2308,8 @@
         </p:nvSpPr>
         <p:spPr>
           <a:xfrm>
-            <a:off x="457200" y="4060080"/>
-            <a:ext cx="8229240" cy="2246040"/>
+            <a:off x="457200" y="3682080"/>
+            <a:ext cx="8229240" cy="1896840"/>
           </a:xfrm>
           <a:prstGeom prst="rect">
             <a:avLst/>
@@ -2346,35 +2366,17 @@
         </p:nvSpPr>
         <p:spPr>
           <a:xfrm>
-            <a:off x="421920" y="1371600"/>
-            <a:ext cx="8229240" cy="1828440"/>
-          </a:xfrm>
-          <a:prstGeom prst="rect">
-            <a:avLst/>
-          </a:prstGeom>
-        </p:spPr>
-        <p:txBody>
-          <a:bodyPr lIns="45720" rIns="45720" tIns="0" bIns="0" anchor="b"/>
-          <a:p>
-            <a:pPr algn="ctr">
-              <a:lnSpc>
-                <a:spcPct val="100000"/>
-              </a:lnSpc>
-            </a:pPr>
-            <a:r>
-              <a:rPr b="1" lang="en-US" sz="4800" spc="-1" strike="noStrike" cap="all">
-                <a:solidFill>
-                  <a:srgbClr val="e9d596"/>
-                </a:solidFill>
-                <a:uFill>
-                  <a:solidFill>
-                    <a:srgbClr val="ffffff"/>
-                  </a:solidFill>
-                </a:uFill>
-                <a:latin typeface="Lucida Sans"/>
-              </a:rPr>
-              <a:t>Click to edit Master title style</a:t>
-            </a:r>
+            <a:off x="457200" y="273600"/>
+            <a:ext cx="8228880" cy="1144440"/>
+          </a:xfrm>
+          <a:prstGeom prst="rect">
+            <a:avLst/>
+          </a:prstGeom>
+        </p:spPr>
+        <p:txBody>
+          <a:bodyPr lIns="0" rIns="0" tIns="0" bIns="0" anchor="ctr"/>
+          <a:p>
+            <a:pPr algn="ctr"/>
             <a:endParaRPr/>
           </a:p>
         </p:txBody>
@@ -2386,174 +2388,13 @@
             <a:spLocks noGrp="1"/>
           </p:cNvSpPr>
           <p:nvPr>
-            <p:ph type="dt"/>
-          </p:nvPr>
-        </p:nvSpPr>
-        <p:spPr>
-          <a:xfrm>
-            <a:off x="457200" y="6416640"/>
-            <a:ext cx="2133360" cy="364680"/>
-          </a:xfrm>
-          <a:prstGeom prst="rect">
-            <a:avLst/>
-          </a:prstGeom>
-        </p:spPr>
-        <p:txBody>
-          <a:bodyPr lIns="90000" rIns="90000" tIns="45000" bIns="45000" anchor="b"/>
-          <a:p>
-            <a:pPr>
-              <a:lnSpc>
-                <a:spcPct val="100000"/>
-              </a:lnSpc>
-            </a:pPr>
-            <a:r>
-              <a:rPr lang="en-US" sz="1200" spc="-1" strike="noStrike">
-                <a:solidFill>
-                  <a:srgbClr val="bcbcbc"/>
-                </a:solidFill>
-                <a:uFill>
-                  <a:solidFill>
-                    <a:srgbClr val="ffffff"/>
-                  </a:solidFill>
-                </a:uFill>
-                <a:latin typeface="Book Antiqua"/>
-              </a:rPr>
-              <a:t>11/30/15</a:t>
-            </a:r>
-            <a:endParaRPr/>
-          </a:p>
-        </p:txBody>
-      </p:sp>
-      <p:sp>
-        <p:nvSpPr>
-          <p:cNvPr id="2" name="PlaceHolder 3"/>
-          <p:cNvSpPr>
-            <a:spLocks noGrp="1"/>
-          </p:cNvSpPr>
-          <p:nvPr>
-            <p:ph type="ftr"/>
-          </p:nvPr>
-        </p:nvSpPr>
-        <p:spPr>
-          <a:xfrm>
-            <a:off x="3124080" y="6416640"/>
-            <a:ext cx="2895120" cy="364680"/>
-          </a:xfrm>
-          <a:prstGeom prst="rect">
-            <a:avLst/>
-          </a:prstGeom>
-        </p:spPr>
-        <p:txBody>
-          <a:bodyPr lIns="90000" rIns="90000" tIns="45000" bIns="45000" anchor="b"/>
-          <a:p>
-            <a:endParaRPr/>
-          </a:p>
-        </p:txBody>
-      </p:sp>
-      <p:sp>
-        <p:nvSpPr>
-          <p:cNvPr id="3" name="PlaceHolder 4"/>
-          <p:cNvSpPr>
-            <a:spLocks noGrp="1"/>
-          </p:cNvSpPr>
-          <p:nvPr>
-            <p:ph type="sldNum"/>
-          </p:nvPr>
-        </p:nvSpPr>
-        <p:spPr>
-          <a:xfrm>
-            <a:off x="7924680" y="6416640"/>
-            <a:ext cx="761760" cy="364680"/>
-          </a:xfrm>
-          <a:prstGeom prst="rect">
-            <a:avLst/>
-          </a:prstGeom>
-        </p:spPr>
-        <p:txBody>
-          <a:bodyPr lIns="0" rIns="0" tIns="45000" bIns="45000" anchor="b"/>
-          <a:p>
-            <a:pPr algn="r">
-              <a:lnSpc>
-                <a:spcPct val="100000"/>
-              </a:lnSpc>
-            </a:pPr>
-            <a:fld id="{C057A971-70D2-4346-BFE9-B4007EF5A535}" type="slidenum">
-              <a:rPr lang="en-US" sz="1200" spc="-1" strike="noStrike">
-                <a:solidFill>
-                  <a:srgbClr val="bcbcbc"/>
-                </a:solidFill>
-                <a:uFill>
-                  <a:solidFill>
-                    <a:srgbClr val="ffffff"/>
-                  </a:solidFill>
-                </a:uFill>
-                <a:latin typeface="Book Antiqua"/>
-              </a:rPr>
-              <a:t>&lt;number&gt;</a:t>
-            </a:fld>
-            <a:endParaRPr/>
-          </a:p>
-        </p:txBody>
-      </p:sp>
-      <p:sp>
-        <p:nvSpPr>
-          <p:cNvPr id="4" name="PlaceHolder 5"/>
-          <p:cNvSpPr>
-            <a:spLocks noGrp="1"/>
-          </p:cNvSpPr>
-          <p:nvPr>
-            <p:ph type="subTitle"/>
-          </p:nvPr>
-        </p:nvSpPr>
-        <p:spPr>
-          <a:xfrm>
-            <a:off x="1371600" y="3331800"/>
-            <a:ext cx="6400440" cy="1752120"/>
-          </a:xfrm>
-          <a:prstGeom prst="rect">
-            <a:avLst/>
-          </a:prstGeom>
-        </p:spPr>
-        <p:txBody>
-          <a:bodyPr lIns="90000" rIns="90000" tIns="45000" bIns="45000"/>
-          <a:p>
-            <a:pPr algn="ctr">
-              <a:lnSpc>
-                <a:spcPct val="100000"/>
-              </a:lnSpc>
-            </a:pPr>
-            <a:r>
-              <a:rPr lang="en-US" sz="2800" spc="-1" strike="noStrike">
-                <a:solidFill>
-                  <a:srgbClr val="ffffff"/>
-                </a:solidFill>
-                <a:uFill>
-                  <a:solidFill>
-                    <a:srgbClr val="ffffff"/>
-                  </a:solidFill>
-                </a:uFill>
-                <a:latin typeface="Book Antiqua"/>
-              </a:rPr>
-              <a:t>Click to edit Master subtitle style</a:t>
-            </a:r>
-            <a:endParaRPr/>
-          </a:p>
-        </p:txBody>
-      </p:sp>
-      <p:sp>
-        <p:nvSpPr>
-          <p:cNvPr id="5" name="PlaceHolder 6"/>
-          <p:cNvSpPr>
-            <a:spLocks noGrp="1"/>
-          </p:cNvSpPr>
-          <p:nvPr>
             <p:ph type="body"/>
           </p:nvPr>
         </p:nvSpPr>
         <p:spPr>
           <a:xfrm>
             <a:off x="457200" y="1604520"/>
-            <a:ext cx="8229240" cy="3977280"/>
+            <a:ext cx="8228880" cy="3976920"/>
           </a:xfrm>
           <a:prstGeom prst="rect">
             <a:avLst/>
@@ -2567,12 +2408,12 @@
                 <a:srgbClr val="ffffff"/>
               </a:buClr>
               <a:buSzPct val="45000"/>
-              <a:buFont typeface="StarSymbol"/>
+              <a:buFont typeface="Wingdings" charset="2"/>
               <a:buChar char=""/>
             </a:pPr>
             <a:r>
-              <a:rPr lang="en-US" sz="2800" spc="-1">
-                <a:latin typeface="Book Antiqua"/>
+              <a:rPr lang="en-US" sz="1800" spc="-1">
+                <a:latin typeface="Arial"/>
               </a:rPr>
               <a:t>Click to edit the outline text format</a:t>
             </a:r>
@@ -2584,12 +2425,12 @@
                 <a:srgbClr val="ffffff"/>
               </a:buClr>
               <a:buSzPct val="75000"/>
-              <a:buFont typeface="StarSymbol"/>
+              <a:buFont typeface="Symbol" charset="2"/>
               <a:buChar char=""/>
             </a:pPr>
             <a:r>
-              <a:rPr lang="en-US" sz="2200" spc="-1">
-                <a:latin typeface="Book Antiqua"/>
+              <a:rPr lang="en-US" sz="1800" spc="-1">
+                <a:latin typeface="Arial"/>
               </a:rPr>
               <a:t>Second Outline Level</a:t>
             </a:r>
@@ -2601,12 +2442,12 @@
                 <a:srgbClr val="ffffff"/>
               </a:buClr>
               <a:buSzPct val="45000"/>
-              <a:buFont typeface="StarSymbol"/>
+              <a:buFont typeface="Wingdings" charset="2"/>
               <a:buChar char=""/>
             </a:pPr>
             <a:r>
-              <a:rPr lang="en-US" sz="2000" spc="-1">
-                <a:latin typeface="Book Antiqua"/>
+              <a:rPr lang="en-US" sz="1800" spc="-1">
+                <a:latin typeface="Arial"/>
               </a:rPr>
               <a:t>Third Outline Level</a:t>
             </a:r>
@@ -2618,12 +2459,12 @@
                 <a:srgbClr val="ffffff"/>
               </a:buClr>
               <a:buSzPct val="75000"/>
-              <a:buFont typeface="StarSymbol"/>
+              <a:buFont typeface="Symbol" charset="2"/>
               <a:buChar char=""/>
             </a:pPr>
             <a:r>
-              <a:rPr lang="en-US" sz="2000" spc="-1">
-                <a:latin typeface="Book Antiqua"/>
+              <a:rPr lang="en-US" sz="1800" spc="-1">
+                <a:latin typeface="Arial"/>
               </a:rPr>
               <a:t>Fourth Outline Level</a:t>
             </a:r>
@@ -2635,12 +2476,12 @@
                 <a:srgbClr val="ffffff"/>
               </a:buClr>
               <a:buSzPct val="45000"/>
-              <a:buFont typeface="StarSymbol"/>
+              <a:buFont typeface="Wingdings" charset="2"/>
               <a:buChar char=""/>
             </a:pPr>
             <a:r>
-              <a:rPr lang="en-US" sz="2000" spc="-1">
-                <a:latin typeface="Book Antiqua"/>
+              <a:rPr lang="en-US" sz="1800" spc="-1">
+                <a:latin typeface="Arial"/>
               </a:rPr>
               <a:t>Fifth Outline Level</a:t>
             </a:r>
@@ -2652,12 +2493,12 @@
                 <a:srgbClr val="ffffff"/>
               </a:buClr>
               <a:buSzPct val="45000"/>
-              <a:buFont typeface="StarSymbol"/>
+              <a:buFont typeface="Wingdings" charset="2"/>
               <a:buChar char=""/>
             </a:pPr>
             <a:r>
-              <a:rPr lang="en-US" sz="2000" spc="-1">
-                <a:latin typeface="Book Antiqua"/>
+              <a:rPr lang="en-US" sz="1800" spc="-1">
+                <a:latin typeface="Arial"/>
               </a:rPr>
               <a:t>Sixth Outline Level</a:t>
             </a:r>
@@ -2669,12 +2510,12 @@
                 <a:srgbClr val="ffffff"/>
               </a:buClr>
               <a:buSzPct val="45000"/>
-              <a:buFont typeface="StarSymbol"/>
+              <a:buFont typeface="Wingdings" charset="2"/>
               <a:buChar char=""/>
             </a:pPr>
             <a:r>
-              <a:rPr lang="en-US" sz="2000" spc="-1">
-                <a:latin typeface="Book Antiqua"/>
+              <a:rPr lang="en-US" sz="1800" spc="-1">
+                <a:latin typeface="Arial"/>
               </a:rPr>
               <a:t>Seventh Outline Level</a:t>
             </a:r>
@@ -2731,7 +2572,7 @@
       </p:grpSpPr>
       <p:sp>
         <p:nvSpPr>
-          <p:cNvPr id="40" name="PlaceHolder 1"/>
+          <p:cNvPr id="36" name="PlaceHolder 1"/>
           <p:cNvSpPr>
             <a:spLocks noGrp="1"/>
           </p:cNvSpPr>
@@ -2741,34 +2582,22 @@
         </p:nvSpPr>
         <p:spPr>
           <a:xfrm>
-            <a:off x="457200" y="274680"/>
-            <a:ext cx="8229240" cy="1142640"/>
-          </a:xfrm>
-          <a:prstGeom prst="rect">
-            <a:avLst/>
-          </a:prstGeom>
-        </p:spPr>
-        <p:txBody>
-          <a:bodyPr lIns="90000" rIns="90000" tIns="45000" bIns="45000" anchor="ctr"/>
-          <a:p>
-            <a:pPr algn="ctr">
-              <a:lnSpc>
-                <a:spcPct val="100000"/>
-              </a:lnSpc>
-            </a:pPr>
+            <a:off x="457200" y="273600"/>
+            <a:ext cx="8229240" cy="1144800"/>
+          </a:xfrm>
+          <a:prstGeom prst="rect">
+            <a:avLst/>
+          </a:prstGeom>
+        </p:spPr>
+        <p:txBody>
+          <a:bodyPr lIns="0" rIns="0" tIns="0" bIns="0" anchor="ctr"/>
+          <a:p>
+            <a:pPr algn="ctr"/>
             <a:r>
-              <a:rPr b="1" lang="en-US" sz="4100" spc="-1" strike="noStrike">
-                <a:solidFill>
-                  <a:srgbClr val="e9d596"/>
-                </a:solidFill>
-                <a:uFill>
-                  <a:solidFill>
-                    <a:srgbClr val="ffffff"/>
-                  </a:solidFill>
-                </a:uFill>
-                <a:latin typeface="Lucida Sans"/>
+              <a:rPr lang="en-US" sz="4400" spc="-1">
+                <a:latin typeface="Arial"/>
               </a:rPr>
-              <a:t>Click to edit Master title style</a:t>
+              <a:t>Click to edit the title text format</a:t>
             </a:r>
             <a:endParaRPr/>
           </a:p>
@@ -2776,7 +2605,7 @@
       </p:sp>
       <p:sp>
         <p:nvSpPr>
-          <p:cNvPr id="41" name="PlaceHolder 2"/>
+          <p:cNvPr id="37" name="PlaceHolder 2"/>
           <p:cNvSpPr>
             <a:spLocks noGrp="1"/>
           </p:cNvSpPr>
@@ -2786,35 +2615,27 @@
         </p:nvSpPr>
         <p:spPr>
           <a:xfrm>
-            <a:off x="457200" y="1600200"/>
-            <a:ext cx="8229240" cy="4708800"/>
-          </a:xfrm>
-          <a:prstGeom prst="rect">
-            <a:avLst/>
-          </a:prstGeom>
-        </p:spPr>
-        <p:txBody>
-          <a:bodyPr lIns="90000" rIns="90000" tIns="45000" bIns="45000"/>
+            <a:off x="457200" y="1604520"/>
+            <a:ext cx="8229240" cy="3977280"/>
+          </a:xfrm>
+          <a:prstGeom prst="rect">
+            <a:avLst/>
+          </a:prstGeom>
+        </p:spPr>
+        <p:txBody>
+          <a:bodyPr lIns="0" rIns="0" tIns="0" bIns="0"/>
           <a:p>
             <a:pPr marL="432000" indent="-324000">
               <a:buClr>
                 <a:srgbClr val="ffffff"/>
               </a:buClr>
               <a:buSzPct val="45000"/>
-              <a:buFont typeface="StarSymbol"/>
+              <a:buFont typeface="Wingdings" charset="2"/>
               <a:buChar char=""/>
             </a:pPr>
             <a:r>
-              <a:rPr lang="en-US" sz="2800" spc="-1" strike="noStrike">
-                <a:solidFill>
-                  <a:srgbClr val="ffffff"/>
-                </a:solidFill>
-                <a:uFill>
-                  <a:solidFill>
-                    <a:srgbClr val="ffffff"/>
-                  </a:solidFill>
-                </a:uFill>
-                <a:latin typeface="Book Antiqua"/>
+              <a:rPr lang="en-US" sz="3200" spc="-1">
+                <a:latin typeface="Arial"/>
               </a:rPr>
               <a:t>Click to edit the outline text format</a:t>
             </a:r>
@@ -2826,20 +2647,12 @@
                 <a:srgbClr val="ffffff"/>
               </a:buClr>
               <a:buSzPct val="75000"/>
-              <a:buFont typeface="StarSymbol"/>
+              <a:buFont typeface="Symbol" charset="2"/>
               <a:buChar char=""/>
             </a:pPr>
             <a:r>
-              <a:rPr lang="en-US" sz="2800" spc="-1" strike="noStrike">
-                <a:solidFill>
-                  <a:srgbClr val="ffffff"/>
-                </a:solidFill>
-                <a:uFill>
-                  <a:solidFill>
-                    <a:srgbClr val="ffffff"/>
-                  </a:solidFill>
-                </a:uFill>
-                <a:latin typeface="Book Antiqua"/>
+              <a:rPr lang="en-US" sz="2800" spc="-1">
+                <a:latin typeface="Arial"/>
               </a:rPr>
               <a:t>Second Outline Level</a:t>
             </a:r>
@@ -2851,20 +2664,12 @@
                 <a:srgbClr val="ffffff"/>
               </a:buClr>
               <a:buSzPct val="45000"/>
-              <a:buFont typeface="StarSymbol"/>
+              <a:buFont typeface="Wingdings" charset="2"/>
               <a:buChar char=""/>
             </a:pPr>
             <a:r>
-              <a:rPr lang="en-US" sz="2800" spc="-1" strike="noStrike">
-                <a:solidFill>
-                  <a:srgbClr val="ffffff"/>
-                </a:solidFill>
-                <a:uFill>
-                  <a:solidFill>
-                    <a:srgbClr val="ffffff"/>
-                  </a:solidFill>
-                </a:uFill>
-                <a:latin typeface="Book Antiqua"/>
+              <a:rPr lang="en-US" sz="2400" spc="-1">
+                <a:latin typeface="Arial"/>
               </a:rPr>
               <a:t>Third Outline Level</a:t>
             </a:r>
@@ -2876,20 +2681,12 @@
                 <a:srgbClr val="ffffff"/>
               </a:buClr>
               <a:buSzPct val="75000"/>
-              <a:buFont typeface="StarSymbol"/>
+              <a:buFont typeface="Symbol" charset="2"/>
               <a:buChar char=""/>
             </a:pPr>
             <a:r>
-              <a:rPr lang="en-US" sz="2800" spc="-1" strike="noStrike">
-                <a:solidFill>
-                  <a:srgbClr val="ffffff"/>
-                </a:solidFill>
-                <a:uFill>
-                  <a:solidFill>
-                    <a:srgbClr val="ffffff"/>
-                  </a:solidFill>
-                </a:uFill>
-                <a:latin typeface="Book Antiqua"/>
+              <a:rPr lang="en-US" sz="2000" spc="-1">
+                <a:latin typeface="Arial"/>
               </a:rPr>
               <a:t>Fourth Outline Level</a:t>
             </a:r>
@@ -2901,20 +2698,12 @@
                 <a:srgbClr val="ffffff"/>
               </a:buClr>
               <a:buSzPct val="45000"/>
-              <a:buFont typeface="StarSymbol"/>
+              <a:buFont typeface="Wingdings" charset="2"/>
               <a:buChar char=""/>
             </a:pPr>
             <a:r>
-              <a:rPr lang="en-US" sz="2800" spc="-1" strike="noStrike">
-                <a:solidFill>
-                  <a:srgbClr val="ffffff"/>
-                </a:solidFill>
-                <a:uFill>
-                  <a:solidFill>
-                    <a:srgbClr val="ffffff"/>
-                  </a:solidFill>
-                </a:uFill>
-                <a:latin typeface="Book Antiqua"/>
+              <a:rPr lang="en-US" sz="2000" spc="-1">
+                <a:latin typeface="Arial"/>
               </a:rPr>
               <a:t>Fifth Outline Level</a:t>
             </a:r>
@@ -2926,277 +2715,32 @@
                 <a:srgbClr val="ffffff"/>
               </a:buClr>
               <a:buSzPct val="45000"/>
-              <a:buFont typeface="StarSymbol"/>
+              <a:buFont typeface="Wingdings" charset="2"/>
               <a:buChar char=""/>
             </a:pPr>
             <a:r>
-              <a:rPr lang="en-US" sz="2800" spc="-1" strike="noStrike">
-                <a:solidFill>
-                  <a:srgbClr val="ffffff"/>
-                </a:solidFill>
-                <a:uFill>
-                  <a:solidFill>
-                    <a:srgbClr val="ffffff"/>
-                  </a:solidFill>
-                </a:uFill>
-                <a:latin typeface="Book Antiqua"/>
+              <a:rPr lang="en-US" sz="2000" spc="-1">
+                <a:latin typeface="Arial"/>
               </a:rPr>
               <a:t>Sixth Outline Level</a:t>
             </a:r>
             <a:endParaRPr/>
           </a:p>
           <a:p>
-            <a:pPr marL="548640" indent="-411120">
-              <a:lnSpc>
-                <a:spcPct val="100000"/>
-              </a:lnSpc>
-              <a:buClr>
-                <a:srgbClr val="f9f9f9"/>
-              </a:buClr>
-              <a:buSzPct val="65000"/>
-              <a:buFont typeface="Wingdings 2" charset="2"/>
-              <a:buChar char=""/>
-            </a:pPr>
-            <a:r>
-              <a:rPr lang="en-US" sz="2800" spc="-1" strike="noStrike">
-                <a:solidFill>
-                  <a:srgbClr val="ffffff"/>
-                </a:solidFill>
-                <a:uFill>
-                  <a:solidFill>
-                    <a:srgbClr val="ffffff"/>
-                  </a:solidFill>
-                </a:uFill>
-                <a:latin typeface="Book Antiqua"/>
-              </a:rPr>
-              <a:t>Seventh Outline LevelClick to edit Master text styles</a:t>
-            </a:r>
-            <a:endParaRPr/>
-          </a:p>
-          <a:p>
-            <a:pPr lvl="1" marL="868680" indent="-282960">
-              <a:lnSpc>
-                <a:spcPct val="100000"/>
-              </a:lnSpc>
+            <a:pPr lvl="6" marL="3024000" indent="-216000">
               <a:buClr>
                 <a:srgbClr val="ffffff"/>
               </a:buClr>
-              <a:buSzPct val="80000"/>
-              <a:buFont typeface="Wingdings 2" charset="2"/>
-              <a:buChar char=""/>
+              <a:buSzPct val="45000"/>
+              <a:buFont typeface="Wingdings" charset="2"/>
+              <a:buChar char=""/>
             </a:pPr>
             <a:r>
-              <a:rPr lang="en-US" sz="2400" spc="-1" strike="noStrike">
-                <a:solidFill>
-                  <a:srgbClr val="ffffff"/>
-                </a:solidFill>
-                <a:uFill>
-                  <a:solidFill>
-                    <a:srgbClr val="ffffff"/>
-                  </a:solidFill>
-                </a:uFill>
-                <a:latin typeface="Book Antiqua"/>
+              <a:rPr lang="en-US" sz="2000" spc="-1">
+                <a:latin typeface="Arial"/>
               </a:rPr>
-              <a:t>Second level</a:t>
+              <a:t>Seventh Outline Level</a:t>
             </a:r>
-            <a:endParaRPr/>
-          </a:p>
-          <a:p>
-            <a:pPr lvl="2" marL="1134000" indent="-228240">
-              <a:lnSpc>
-                <a:spcPct val="100000"/>
-              </a:lnSpc>
-              <a:buClr>
-                <a:srgbClr val="ffffff"/>
-              </a:buClr>
-              <a:buSzPct val="95000"/>
-              <a:buFont typeface="Wingdings" charset="2"/>
-              <a:buChar char=""/>
-            </a:pPr>
-            <a:r>
-              <a:rPr lang="en-US" sz="2200" spc="-1" strike="noStrike">
-                <a:solidFill>
-                  <a:srgbClr val="ffffff"/>
-                </a:solidFill>
-                <a:uFill>
-                  <a:solidFill>
-                    <a:srgbClr val="ffffff"/>
-                  </a:solidFill>
-                </a:uFill>
-                <a:latin typeface="Book Antiqua"/>
-              </a:rPr>
-              <a:t>Third level</a:t>
-            </a:r>
-            <a:endParaRPr/>
-          </a:p>
-          <a:p>
-            <a:pPr lvl="3" marL="1353240" indent="-182520">
-              <a:lnSpc>
-                <a:spcPct val="100000"/>
-              </a:lnSpc>
-              <a:buClr>
-                <a:srgbClr val="ffffff"/>
-              </a:buClr>
-              <a:buFont typeface="Wingdings 3" charset="2"/>
-              <a:buChar char=""/>
-            </a:pPr>
-            <a:r>
-              <a:rPr lang="en-US" sz="2000" spc="-1" strike="noStrike">
-                <a:solidFill>
-                  <a:srgbClr val="ffffff"/>
-                </a:solidFill>
-                <a:uFill>
-                  <a:solidFill>
-                    <a:srgbClr val="ffffff"/>
-                  </a:solidFill>
-                </a:uFill>
-                <a:latin typeface="Book Antiqua"/>
-              </a:rPr>
-              <a:t>Fourth level</a:t>
-            </a:r>
-            <a:endParaRPr/>
-          </a:p>
-          <a:p>
-            <a:pPr lvl="4" marL="1545480" indent="-182520">
-              <a:lnSpc>
-                <a:spcPct val="100000"/>
-              </a:lnSpc>
-              <a:buClr>
-                <a:srgbClr val="ffffff"/>
-              </a:buClr>
-              <a:buFont typeface="Wingdings 2" charset="2"/>
-              <a:buChar char=""/>
-            </a:pPr>
-            <a:r>
-              <a:rPr lang="en-US" sz="2000" spc="-1" strike="noStrike">
-                <a:solidFill>
-                  <a:srgbClr val="ffffff"/>
-                </a:solidFill>
-                <a:uFill>
-                  <a:solidFill>
-                    <a:srgbClr val="ffffff"/>
-                  </a:solidFill>
-                </a:uFill>
-                <a:latin typeface="Book Antiqua"/>
-              </a:rPr>
-              <a:t>Fifth level</a:t>
-            </a:r>
-            <a:endParaRPr/>
-          </a:p>
-        </p:txBody>
-      </p:sp>
-      <p:sp>
-        <p:nvSpPr>
-          <p:cNvPr id="42" name="PlaceHolder 3"/>
-          <p:cNvSpPr>
-            <a:spLocks noGrp="1"/>
-          </p:cNvSpPr>
-          <p:nvPr>
-            <p:ph type="dt"/>
-          </p:nvPr>
-        </p:nvSpPr>
-        <p:spPr>
-          <a:xfrm>
-            <a:off x="457200" y="6416640"/>
-            <a:ext cx="2133360" cy="364680"/>
-          </a:xfrm>
-          <a:prstGeom prst="rect">
-            <a:avLst/>
-          </a:prstGeom>
-        </p:spPr>
-        <p:txBody>
-          <a:bodyPr lIns="90000" rIns="90000" tIns="45000" bIns="45000" anchor="b"/>
-          <a:p>
-            <a:pPr>
-              <a:lnSpc>
-                <a:spcPct val="100000"/>
-              </a:lnSpc>
-            </a:pPr>
-            <a:r>
-              <a:rPr lang="en-US" sz="1200" spc="-1" strike="noStrike">
-                <a:solidFill>
-                  <a:srgbClr val="bcbcbc"/>
-                </a:solidFill>
-                <a:uFill>
-                  <a:solidFill>
-                    <a:srgbClr val="ffffff"/>
-                  </a:solidFill>
-                </a:uFill>
-                <a:latin typeface="Book Antiqua"/>
-              </a:rPr>
-              <a:t>11/30/15</a:t>
-            </a:r>
-            <a:endParaRPr/>
-          </a:p>
-        </p:txBody>
-      </p:sp>
-      <p:sp>
-        <p:nvSpPr>
-          <p:cNvPr id="43" name="PlaceHolder 4"/>
-          <p:cNvSpPr>
-            <a:spLocks noGrp="1"/>
-          </p:cNvSpPr>
-          <p:nvPr>
-            <p:ph type="ftr"/>
-          </p:nvPr>
-        </p:nvSpPr>
-        <p:spPr>
-          <a:xfrm>
-            <a:off x="3124080" y="6416640"/>
-            <a:ext cx="2895120" cy="364680"/>
-          </a:xfrm>
-          <a:prstGeom prst="rect">
-            <a:avLst/>
-          </a:prstGeom>
-        </p:spPr>
-        <p:txBody>
-          <a:bodyPr lIns="90000" rIns="90000" tIns="45000" bIns="45000" anchor="b"/>
-          <a:p>
-            <a:endParaRPr/>
-          </a:p>
-        </p:txBody>
-      </p:sp>
-      <p:sp>
-        <p:nvSpPr>
-          <p:cNvPr id="44" name="PlaceHolder 5"/>
-          <p:cNvSpPr>
-            <a:spLocks noGrp="1"/>
-          </p:cNvSpPr>
-          <p:nvPr>
-            <p:ph type="sldNum"/>
-          </p:nvPr>
-        </p:nvSpPr>
-        <p:spPr>
-          <a:xfrm>
-            <a:off x="7924680" y="6416640"/>
-            <a:ext cx="761760" cy="364680"/>
-          </a:xfrm>
-          <a:prstGeom prst="rect">
-            <a:avLst/>
-          </a:prstGeom>
-        </p:spPr>
-        <p:txBody>
-          <a:bodyPr lIns="0" rIns="0" tIns="45000" bIns="45000" anchor="b"/>
-          <a:p>
-            <a:pPr algn="r">
-              <a:lnSpc>
-                <a:spcPct val="100000"/>
-              </a:lnSpc>
-            </a:pPr>
-            <a:fld id="{BFF6917B-19C5-461C-9007-F11D7EBE4E4F}" type="slidenum">
-              <a:rPr lang="en-US" sz="1200" spc="-1" strike="noStrike">
-                <a:solidFill>
-                  <a:srgbClr val="bcbcbc"/>
-                </a:solidFill>
-                <a:uFill>
-                  <a:solidFill>
-                    <a:srgbClr val="ffffff"/>
-                  </a:solidFill>
-                </a:uFill>
-                <a:latin typeface="Book Antiqua"/>
-              </a:rPr>
-              <a:t>&lt;number&gt;</a:t>
-            </a:fld>
             <a:endParaRPr/>
           </a:p>
         </p:txBody>
@@ -3240,14 +2784,14 @@
       </p:grpSpPr>
       <p:sp>
         <p:nvSpPr>
-          <p:cNvPr id="79" name="TextShape 1"/>
-          <p:cNvSpPr txBox="1"/>
+          <p:cNvPr id="72" name="CustomShape 1"/>
+          <p:cNvSpPr/>
           <p:nvPr/>
         </p:nvSpPr>
         <p:spPr>
           <a:xfrm>
             <a:off x="598320" y="152280"/>
-            <a:ext cx="7772040" cy="1012320"/>
+            <a:ext cx="7771320" cy="1011600"/>
           </a:xfrm>
           <a:prstGeom prst="rect">
             <a:avLst/>
@@ -3257,6 +2801,12 @@
             <a:noFill/>
           </a:ln>
         </p:spPr>
+        <p:style>
+          <a:lnRef idx="0"/>
+          <a:fillRef idx="0"/>
+          <a:effectRef idx="0"/>
+          <a:fontRef idx="minor"/>
+        </p:style>
         <p:txBody>
           <a:bodyPr lIns="45720" rIns="45720" tIns="0" bIns="0" anchor="b"/>
           <a:p>
@@ -3276,6 +2826,7 @@
                   </a:solidFill>
                 </a:uFill>
                 <a:latin typeface="Lucida Sans"/>
+                <a:ea typeface="DejaVu Sans"/>
               </a:rPr>
               <a:t>Email Spam Filtering</a:t>
             </a:r>
@@ -3285,14 +2836,14 @@
       </p:sp>
       <p:sp>
         <p:nvSpPr>
-          <p:cNvPr id="80" name="TextShape 2"/>
-          <p:cNvSpPr txBox="1"/>
+          <p:cNvPr id="73" name="CustomShape 2"/>
+          <p:cNvSpPr/>
           <p:nvPr/>
         </p:nvSpPr>
         <p:spPr>
           <a:xfrm>
             <a:off x="1143000" y="1523880"/>
-            <a:ext cx="7009920" cy="1752120"/>
+            <a:ext cx="7009200" cy="1751400"/>
           </a:xfrm>
           <a:prstGeom prst="rect">
             <a:avLst/>
@@ -3302,6 +2853,12 @@
             <a:noFill/>
           </a:ln>
         </p:spPr>
+        <p:style>
+          <a:lnRef idx="0"/>
+          <a:fillRef idx="0"/>
+          <a:effectRef idx="0"/>
+          <a:fontRef idx="minor"/>
+        </p:style>
         <p:txBody>
           <a:bodyPr lIns="90000" rIns="90000" tIns="45000" bIns="45000"/>
           <a:p>
@@ -3321,6 +2878,7 @@
                   </a:solidFill>
                 </a:uFill>
                 <a:latin typeface="Book Antiqua"/>
+                <a:ea typeface="DejaVu Sans"/>
               </a:rPr>
               <a:t>By Nathan Wikle, Valerie Free, Chris To</a:t>
             </a:r>
@@ -3330,7 +2888,7 @@
       </p:sp>
       <p:pic>
         <p:nvPicPr>
-          <p:cNvPr id="81" name="Picture 2" descr=""/>
+          <p:cNvPr id="74" name="Picture 2" descr=""/>
           <p:cNvPicPr/>
           <p:nvPr/>
         </p:nvPicPr>
@@ -3341,7 +2899,7 @@
         <p:spPr>
           <a:xfrm>
             <a:off x="2743200" y="2362320"/>
-            <a:ext cx="3482280" cy="3858840"/>
+            <a:ext cx="3481560" cy="3858120"/>
           </a:xfrm>
           <a:prstGeom prst="rect">
             <a:avLst/>
@@ -3402,14 +2960,14 @@
       </p:grpSpPr>
       <p:sp>
         <p:nvSpPr>
-          <p:cNvPr id="82" name="TextShape 1"/>
-          <p:cNvSpPr txBox="1"/>
+          <p:cNvPr id="75" name="CustomShape 1"/>
+          <p:cNvSpPr/>
           <p:nvPr/>
         </p:nvSpPr>
         <p:spPr>
           <a:xfrm>
             <a:off x="457200" y="274680"/>
-            <a:ext cx="8229240" cy="1142640"/>
+            <a:ext cx="8228520" cy="1141920"/>
           </a:xfrm>
           <a:prstGeom prst="rect">
             <a:avLst/>
@@ -3419,6 +2977,12 @@
             <a:noFill/>
           </a:ln>
         </p:spPr>
+        <p:style>
+          <a:lnRef idx="0"/>
+          <a:fillRef idx="0"/>
+          <a:effectRef idx="0"/>
+          <a:fontRef idx="minor"/>
+        </p:style>
         <p:txBody>
           <a:bodyPr lIns="90000" rIns="90000" tIns="45000" bIns="45000" anchor="ctr"/>
           <a:p>
@@ -3438,6 +3002,7 @@
                   </a:solidFill>
                 </a:uFill>
                 <a:latin typeface="Lucida Sans"/>
+                <a:ea typeface="DejaVu Sans"/>
               </a:rPr>
               <a:t>Our Topic</a:t>
             </a:r>
@@ -3447,14 +3012,14 @@
       </p:sp>
       <p:sp>
         <p:nvSpPr>
-          <p:cNvPr id="83" name="TextShape 2"/>
-          <p:cNvSpPr txBox="1"/>
+          <p:cNvPr id="76" name="CustomShape 2"/>
+          <p:cNvSpPr/>
           <p:nvPr/>
         </p:nvSpPr>
         <p:spPr>
           <a:xfrm>
             <a:off x="457200" y="1600200"/>
-            <a:ext cx="8229240" cy="4708800"/>
+            <a:ext cx="8228520" cy="4708080"/>
           </a:xfrm>
           <a:prstGeom prst="rect">
             <a:avLst/>
@@ -3464,10 +3029,16 @@
             <a:noFill/>
           </a:ln>
         </p:spPr>
+        <p:style>
+          <a:lnRef idx="0"/>
+          <a:fillRef idx="0"/>
+          <a:effectRef idx="0"/>
+          <a:fontRef idx="minor"/>
+        </p:style>
         <p:txBody>
           <a:bodyPr lIns="90000" rIns="90000" tIns="45000" bIns="45000"/>
           <a:p>
-            <a:pPr marL="548640" indent="-411120">
+            <a:pPr marL="548640" indent="-410400">
               <a:lnSpc>
                 <a:spcPct val="100000"/>
               </a:lnSpc>
@@ -3489,13 +3060,14 @@
                   </a:solidFill>
                 </a:uFill>
                 <a:latin typeface="Book Antiqua"/>
+                <a:ea typeface="DejaVu Sans"/>
               </a:rPr>
               <a:t>Spam filter for emails using Naïve Bayes classifiers</a:t>
             </a:r>
             <a:endParaRPr/>
           </a:p>
           <a:p>
-            <a:pPr marL="548640" indent="-411120">
+            <a:pPr marL="548640" indent="-410400">
               <a:lnSpc>
                 <a:spcPct val="100000"/>
               </a:lnSpc>
@@ -3517,6 +3089,7 @@
                   </a:solidFill>
                 </a:uFill>
                 <a:latin typeface="Book Antiqua"/>
+                <a:ea typeface="DejaVu Sans"/>
               </a:rPr>
               <a:t>Goal: to create a program that can classify an input email as spam or “ham”</a:t>
             </a:r>
@@ -3526,7 +3099,7 @@
       </p:sp>
       <p:pic>
         <p:nvPicPr>
-          <p:cNvPr id="84" name="Picture 3" descr=""/>
+          <p:cNvPr id="77" name="Picture 3" descr=""/>
           <p:cNvPicPr/>
           <p:nvPr/>
         </p:nvPicPr>
@@ -3537,7 +3110,7 @@
         <p:spPr>
           <a:xfrm>
             <a:off x="1447920" y="3429000"/>
-            <a:ext cx="2844360" cy="2844360"/>
+            <a:ext cx="2843640" cy="2843640"/>
           </a:xfrm>
           <a:prstGeom prst="rect">
             <a:avLst/>
@@ -3549,7 +3122,7 @@
       </p:pic>
       <p:pic>
         <p:nvPicPr>
-          <p:cNvPr id="85" name="Picture 4" descr=""/>
+          <p:cNvPr id="78" name="Picture 4" descr=""/>
           <p:cNvPicPr/>
           <p:nvPr/>
         </p:nvPicPr>
@@ -3560,7 +3133,7 @@
         <p:spPr>
           <a:xfrm>
             <a:off x="4888440" y="3861720"/>
-            <a:ext cx="2518560" cy="1909800"/>
+            <a:ext cx="2517840" cy="1909080"/>
           </a:xfrm>
           <a:prstGeom prst="rect">
             <a:avLst/>
@@ -3621,14 +3194,14 @@
       </p:grpSpPr>
       <p:sp>
         <p:nvSpPr>
-          <p:cNvPr id="86" name="TextShape 1"/>
-          <p:cNvSpPr txBox="1"/>
+          <p:cNvPr id="79" name="CustomShape 1"/>
+          <p:cNvSpPr/>
           <p:nvPr/>
         </p:nvSpPr>
         <p:spPr>
           <a:xfrm>
             <a:off x="457200" y="274680"/>
-            <a:ext cx="8229240" cy="1142640"/>
+            <a:ext cx="8228520" cy="1141920"/>
           </a:xfrm>
           <a:prstGeom prst="rect">
             <a:avLst/>
@@ -3638,6 +3211,12 @@
             <a:noFill/>
           </a:ln>
         </p:spPr>
+        <p:style>
+          <a:lnRef idx="0"/>
+          <a:fillRef idx="0"/>
+          <a:effectRef idx="0"/>
+          <a:fontRef idx="minor"/>
+        </p:style>
         <p:txBody>
           <a:bodyPr lIns="90000" rIns="90000" tIns="45000" bIns="45000" anchor="ctr"/>
           <a:p>
@@ -3657,6 +3236,7 @@
                   </a:solidFill>
                 </a:uFill>
                 <a:latin typeface="Lucida Sans"/>
+                <a:ea typeface="DejaVu Sans"/>
               </a:rPr>
               <a:t>Why Spam Filtering?</a:t>
             </a:r>
@@ -3666,14 +3246,14 @@
       </p:sp>
       <p:sp>
         <p:nvSpPr>
-          <p:cNvPr id="87" name="TextShape 2"/>
-          <p:cNvSpPr txBox="1"/>
+          <p:cNvPr id="80" name="CustomShape 2"/>
+          <p:cNvSpPr/>
           <p:nvPr/>
         </p:nvSpPr>
         <p:spPr>
           <a:xfrm>
             <a:off x="457200" y="1600200"/>
-            <a:ext cx="8229240" cy="4708800"/>
+            <a:ext cx="8228520" cy="4708080"/>
           </a:xfrm>
           <a:prstGeom prst="rect">
             <a:avLst/>
@@ -3683,10 +3263,16 @@
             <a:noFill/>
           </a:ln>
         </p:spPr>
+        <p:style>
+          <a:lnRef idx="0"/>
+          <a:fillRef idx="0"/>
+          <a:effectRef idx="0"/>
+          <a:fontRef idx="minor"/>
+        </p:style>
         <p:txBody>
           <a:bodyPr lIns="90000" rIns="90000" tIns="45000" bIns="45000"/>
           <a:p>
-            <a:pPr marL="548640" indent="-411120">
+            <a:pPr marL="548640" indent="-410400">
               <a:lnSpc>
                 <a:spcPct val="100000"/>
               </a:lnSpc>
@@ -3708,6 +3294,7 @@
                   </a:solidFill>
                 </a:uFill>
                 <a:latin typeface="Book Antiqua"/>
+                <a:ea typeface="DejaVu Sans"/>
               </a:rPr>
               <a:t>Spam filtering is an important process implemented by all modern email providers</a:t>
             </a:r>
@@ -3746,7 +3333,7 @@
             <a:endParaRPr/>
           </a:p>
           <a:p>
-            <a:pPr marL="548640" indent="-411120">
+            <a:pPr marL="548640" indent="-410400">
               <a:lnSpc>
                 <a:spcPct val="100000"/>
               </a:lnSpc>
@@ -3768,6 +3355,7 @@
                   </a:solidFill>
                 </a:uFill>
                 <a:latin typeface="Book Antiqua"/>
+                <a:ea typeface="DejaVu Sans"/>
               </a:rPr>
               <a:t>Easy enough to develop an effective spam filter for the scope of this project</a:t>
             </a:r>
@@ -3785,7 +3373,7 @@
       </p:sp>
       <p:pic>
         <p:nvPicPr>
-          <p:cNvPr id="88" name="Picture 2" descr=""/>
+          <p:cNvPr id="81" name="Picture 2" descr=""/>
           <p:cNvPicPr/>
           <p:nvPr/>
         </p:nvPicPr>
@@ -3796,7 +3384,7 @@
         <p:spPr>
           <a:xfrm>
             <a:off x="3124080" y="2743200"/>
-            <a:ext cx="2437920" cy="1614960"/>
+            <a:ext cx="2437200" cy="1614240"/>
           </a:xfrm>
           <a:prstGeom prst="rect">
             <a:avLst/>
@@ -3857,14 +3445,14 @@
       </p:grpSpPr>
       <p:sp>
         <p:nvSpPr>
-          <p:cNvPr id="89" name="TextShape 1"/>
-          <p:cNvSpPr txBox="1"/>
+          <p:cNvPr id="82" name="CustomShape 1"/>
+          <p:cNvSpPr/>
           <p:nvPr/>
         </p:nvSpPr>
         <p:spPr>
           <a:xfrm>
             <a:off x="457200" y="274680"/>
-            <a:ext cx="8229240" cy="1142640"/>
+            <a:ext cx="8228520" cy="1141920"/>
           </a:xfrm>
           <a:prstGeom prst="rect">
             <a:avLst/>
@@ -3874,6 +3462,12 @@
             <a:noFill/>
           </a:ln>
         </p:spPr>
+        <p:style>
+          <a:lnRef idx="0"/>
+          <a:fillRef idx="0"/>
+          <a:effectRef idx="0"/>
+          <a:fontRef idx="minor"/>
+        </p:style>
         <p:txBody>
           <a:bodyPr lIns="90000" rIns="90000" tIns="45000" bIns="45000" anchor="ctr"/>
           <a:p>
@@ -3893,6 +3487,7 @@
                   </a:solidFill>
                 </a:uFill>
                 <a:latin typeface="Lucida Sans"/>
+                <a:ea typeface="DejaVu Sans"/>
               </a:rPr>
               <a:t>Background: Naïve Bayes Classifiers</a:t>
             </a:r>
@@ -3902,14 +3497,14 @@
       </p:sp>
       <p:sp>
         <p:nvSpPr>
-          <p:cNvPr id="90" name="TextShape 2"/>
-          <p:cNvSpPr txBox="1"/>
+          <p:cNvPr id="83" name="CustomShape 2"/>
+          <p:cNvSpPr/>
           <p:nvPr/>
         </p:nvSpPr>
         <p:spPr>
           <a:xfrm>
             <a:off x="457200" y="1600200"/>
-            <a:ext cx="8229240" cy="4708800"/>
+            <a:ext cx="8228520" cy="4708080"/>
           </a:xfrm>
           <a:prstGeom prst="rect">
             <a:avLst/>
@@ -3919,10 +3514,16 @@
             <a:noFill/>
           </a:ln>
         </p:spPr>
+        <p:style>
+          <a:lnRef idx="0"/>
+          <a:fillRef idx="0"/>
+          <a:effectRef idx="0"/>
+          <a:fontRef idx="minor"/>
+        </p:style>
         <p:txBody>
           <a:bodyPr lIns="90000" rIns="90000" tIns="45000" bIns="45000"/>
           <a:p>
-            <a:pPr marL="548640" indent="-411120">
+            <a:pPr marL="548640" indent="-410400">
               <a:lnSpc>
                 <a:spcPct val="100000"/>
               </a:lnSpc>
@@ -3944,13 +3545,14 @@
                   </a:solidFill>
                 </a:uFill>
                 <a:latin typeface="Book Antiqua"/>
+                <a:ea typeface="DejaVu Sans"/>
               </a:rPr>
               <a:t>Classifiers are models that assign labels to instances of the problem; in our case, labeling emails as spam or “ham”</a:t>
             </a:r>
             <a:endParaRPr/>
           </a:p>
           <a:p>
-            <a:pPr marL="548640" indent="-411120">
+            <a:pPr marL="548640" indent="-410400">
               <a:lnSpc>
                 <a:spcPct val="100000"/>
               </a:lnSpc>
@@ -3972,13 +3574,14 @@
                   </a:solidFill>
                 </a:uFill>
                 <a:latin typeface="Book Antiqua"/>
+                <a:ea typeface="DejaVu Sans"/>
               </a:rPr>
               <a:t>Naïve Bayes is a technique for constructing such classifiers</a:t>
             </a:r>
             <a:endParaRPr/>
           </a:p>
           <a:p>
-            <a:pPr marL="548640" indent="-411120">
+            <a:pPr marL="548640" indent="-410400">
               <a:lnSpc>
                 <a:spcPct val="100000"/>
               </a:lnSpc>
@@ -4000,13 +3603,14 @@
                   </a:solidFill>
                 </a:uFill>
                 <a:latin typeface="Book Antiqua"/>
+                <a:ea typeface="DejaVu Sans"/>
               </a:rPr>
               <a:t>Called “naïve” because it makes strong assumptions about independence of values of features</a:t>
             </a:r>
             <a:endParaRPr/>
           </a:p>
           <a:p>
-            <a:pPr marL="548640" indent="-411120">
+            <a:pPr marL="548640" indent="-410400">
               <a:lnSpc>
                 <a:spcPct val="100000"/>
               </a:lnSpc>
@@ -4028,6 +3632,7 @@
                   </a:solidFill>
                 </a:uFill>
                 <a:latin typeface="Book Antiqua"/>
+                <a:ea typeface="DejaVu Sans"/>
               </a:rPr>
               <a:t>Is quite effective with some real-world classification problems</a:t>
             </a:r>
@@ -4086,14 +3691,14 @@
       </p:grpSpPr>
       <p:sp>
         <p:nvSpPr>
-          <p:cNvPr id="91" name="TextShape 1"/>
-          <p:cNvSpPr txBox="1"/>
+          <p:cNvPr id="84" name="CustomShape 1"/>
+          <p:cNvSpPr/>
           <p:nvPr/>
         </p:nvSpPr>
         <p:spPr>
           <a:xfrm>
             <a:off x="457200" y="274680"/>
-            <a:ext cx="8229240" cy="1142640"/>
+            <a:ext cx="8228520" cy="1141920"/>
           </a:xfrm>
           <a:prstGeom prst="rect">
             <a:avLst/>
@@ -4103,6 +3708,12 @@
             <a:noFill/>
           </a:ln>
         </p:spPr>
+        <p:style>
+          <a:lnRef idx="0"/>
+          <a:fillRef idx="0"/>
+          <a:effectRef idx="0"/>
+          <a:fontRef idx="minor"/>
+        </p:style>
         <p:txBody>
           <a:bodyPr lIns="90000" rIns="90000" tIns="45000" bIns="45000" anchor="ctr"/>
           <a:p>
@@ -4122,6 +3733,7 @@
                   </a:solidFill>
                 </a:uFill>
                 <a:latin typeface="Lucida Sans"/>
+                <a:ea typeface="DejaVu Sans"/>
               </a:rPr>
               <a:t>Basic Algorithm</a:t>
             </a:r>
@@ -4131,14 +3743,14 @@
       </p:sp>
       <p:sp>
         <p:nvSpPr>
-          <p:cNvPr id="92" name="TextShape 2"/>
-          <p:cNvSpPr txBox="1"/>
+          <p:cNvPr id="85" name="CustomShape 2"/>
+          <p:cNvSpPr/>
           <p:nvPr/>
         </p:nvSpPr>
         <p:spPr>
           <a:xfrm>
             <a:off x="457200" y="1600200"/>
-            <a:ext cx="8229240" cy="4708800"/>
+            <a:ext cx="8228520" cy="4708080"/>
           </a:xfrm>
           <a:prstGeom prst="rect">
             <a:avLst/>
@@ -4148,10 +3760,16 @@
             <a:noFill/>
           </a:ln>
         </p:spPr>
+        <p:style>
+          <a:lnRef idx="0"/>
+          <a:fillRef idx="0"/>
+          <a:effectRef idx="0"/>
+          <a:fontRef idx="minor"/>
+        </p:style>
         <p:txBody>
           <a:bodyPr lIns="90000" rIns="90000" tIns="45000" bIns="45000"/>
           <a:p>
-            <a:pPr marL="548640" indent="-411120">
+            <a:pPr marL="548640" indent="-410400">
               <a:lnSpc>
                 <a:spcPct val="100000"/>
               </a:lnSpc>
@@ -4173,13 +3791,14 @@
                   </a:solidFill>
                 </a:uFill>
                 <a:latin typeface="Book Antiqua"/>
+                <a:ea typeface="DejaVu Sans"/>
               </a:rPr>
               <a:t>Use large training set of emails</a:t>
             </a:r>
             <a:endParaRPr/>
           </a:p>
           <a:p>
-            <a:pPr marL="548640" indent="-411120">
+            <a:pPr marL="548640" indent="-410400">
               <a:lnSpc>
                 <a:spcPct val="100000"/>
               </a:lnSpc>
@@ -4201,13 +3820,14 @@
                   </a:solidFill>
                 </a:uFill>
                 <a:latin typeface="Book Antiqua"/>
+                <a:ea typeface="DejaVu Sans"/>
               </a:rPr>
               <a:t>Count how many times each word appears in spam and how many times it appears in “ham”</a:t>
             </a:r>
             <a:endParaRPr/>
           </a:p>
           <a:p>
-            <a:pPr marL="548640" indent="-411120">
+            <a:pPr marL="548640" indent="-410400">
               <a:lnSpc>
                 <a:spcPct val="100000"/>
               </a:lnSpc>
@@ -4229,13 +3849,14 @@
                   </a:solidFill>
                 </a:uFill>
                 <a:latin typeface="Book Antiqua"/>
+                <a:ea typeface="DejaVu Sans"/>
               </a:rPr>
               <a:t>Calculate probability that individual word is associated with spam</a:t>
             </a:r>
             <a:endParaRPr/>
           </a:p>
           <a:p>
-            <a:pPr marL="548640" indent="-411120">
+            <a:pPr marL="548640" indent="-410400">
               <a:lnSpc>
                 <a:spcPct val="100000"/>
               </a:lnSpc>
@@ -4257,6 +3878,7 @@
                   </a:solidFill>
                 </a:uFill>
                 <a:latin typeface="Book Antiqua"/>
+                <a:ea typeface="DejaVu Sans"/>
               </a:rPr>
               <a:t>Use Multinomial Naïve Bayes Boolean calculation to determine whether an input email is spam, based on probabilities of individual words found in email</a:t>
             </a:r>
@@ -4315,14 +3937,14 @@
       </p:grpSpPr>
       <p:sp>
         <p:nvSpPr>
-          <p:cNvPr id="93" name="TextShape 1"/>
-          <p:cNvSpPr txBox="1"/>
+          <p:cNvPr id="86" name="CustomShape 1"/>
+          <p:cNvSpPr/>
           <p:nvPr/>
         </p:nvSpPr>
         <p:spPr>
           <a:xfrm>
             <a:off x="457200" y="274680"/>
-            <a:ext cx="8229240" cy="1142640"/>
+            <a:ext cx="8228520" cy="1141920"/>
           </a:xfrm>
           <a:prstGeom prst="rect">
             <a:avLst/>
@@ -4332,6 +3954,12 @@
             <a:noFill/>
           </a:ln>
         </p:spPr>
+        <p:style>
+          <a:lnRef idx="0"/>
+          <a:fillRef idx="0"/>
+          <a:effectRef idx="0"/>
+          <a:fontRef idx="minor"/>
+        </p:style>
         <p:txBody>
           <a:bodyPr lIns="90000" rIns="90000" tIns="45000" bIns="45000" anchor="ctr"/>
           <a:p>
@@ -4351,6 +3979,7 @@
                   </a:solidFill>
                 </a:uFill>
                 <a:latin typeface="Lucida Sans"/>
+                <a:ea typeface="DejaVu Sans"/>
               </a:rPr>
               <a:t>Multinomial Naive Bayes</a:t>
             </a:r>
@@ -4360,14 +3989,14 @@
       </p:sp>
       <p:sp>
         <p:nvSpPr>
-          <p:cNvPr id="94" name="TextShape 2"/>
-          <p:cNvSpPr txBox="1"/>
+          <p:cNvPr id="87" name="CustomShape 2"/>
+          <p:cNvSpPr/>
           <p:nvPr/>
         </p:nvSpPr>
         <p:spPr>
           <a:xfrm>
             <a:off x="457200" y="1600200"/>
-            <a:ext cx="8229240" cy="4708800"/>
+            <a:ext cx="8228520" cy="4708080"/>
           </a:xfrm>
           <a:prstGeom prst="rect">
             <a:avLst/>
@@ -4377,10 +4006,16 @@
             <a:noFill/>
           </a:ln>
         </p:spPr>
+        <p:style>
+          <a:lnRef idx="0"/>
+          <a:fillRef idx="0"/>
+          <a:effectRef idx="0"/>
+          <a:fontRef idx="minor"/>
+        </p:style>
         <p:txBody>
           <a:bodyPr lIns="90000" rIns="90000" tIns="45000" bIns="45000"/>
           <a:p>
-            <a:pPr marL="548640" indent="-411120">
+            <a:pPr marL="548640" indent="-410400">
               <a:lnSpc>
                 <a:spcPct val="100000"/>
               </a:lnSpc>
@@ -4402,13 +4037,14 @@
                   </a:solidFill>
                 </a:uFill>
                 <a:latin typeface="Book Antiqua"/>
+                <a:ea typeface="DejaVu Sans"/>
               </a:rPr>
               <a:t>Represent each message as a vector, </a:t>
             </a:r>
             <a:endParaRPr/>
           </a:p>
           <a:p>
-            <a:pPr marL="548640" indent="-411120">
+            <a:pPr marL="548640" indent="-410400">
               <a:lnSpc>
                 <a:spcPct val="100000"/>
               </a:lnSpc>
@@ -4430,6 +4066,7 @@
                   </a:solidFill>
                 </a:uFill>
                 <a:latin typeface="Book Antiqua"/>
+                <a:ea typeface="DejaVu Sans"/>
               </a:rPr>
               <a:t>x</a:t>
             </a:r>
@@ -4444,13 +4081,14 @@
                   </a:solidFill>
                 </a:uFill>
                 <a:latin typeface="Book Antiqua"/>
+                <a:ea typeface="DejaVu Sans"/>
               </a:rPr>
               <a:t> = &lt;x_1, …, x_m&gt;</a:t>
             </a:r>
             <a:endParaRPr/>
           </a:p>
           <a:p>
-            <a:pPr marL="548640" indent="-411120">
+            <a:pPr marL="548640" indent="-410400">
               <a:lnSpc>
                 <a:spcPct val="100000"/>
               </a:lnSpc>
@@ -4472,13 +4110,14 @@
                   </a:solidFill>
                 </a:uFill>
                 <a:latin typeface="Book Antiqua"/>
+                <a:ea typeface="DejaVu Sans"/>
               </a:rPr>
               <a:t>Consider two classes: spam and ham</a:t>
             </a:r>
             <a:endParaRPr/>
           </a:p>
           <a:p>
-            <a:pPr marL="548640" indent="-411120">
+            <a:pPr marL="548640" indent="-410400">
               <a:lnSpc>
                 <a:spcPct val="100000"/>
               </a:lnSpc>
@@ -4500,6 +4139,7 @@
                   </a:solidFill>
                 </a:uFill>
                 <a:latin typeface="Book Antiqua"/>
+                <a:ea typeface="DejaVu Sans"/>
               </a:rPr>
               <a:t>Classify message </a:t>
             </a:r>
@@ -4514,6 +4154,7 @@
                   </a:solidFill>
                 </a:uFill>
                 <a:latin typeface="Book Antiqua"/>
+                <a:ea typeface="DejaVu Sans"/>
               </a:rPr>
               <a:t>x</a:t>
             </a:r>
@@ -4528,13 +4169,14 @@
                   </a:solidFill>
                 </a:uFill>
                 <a:latin typeface="Book Antiqua"/>
+                <a:ea typeface="DejaVu Sans"/>
               </a:rPr>
               <a:t> as spam if</a:t>
             </a:r>
             <a:endParaRPr/>
           </a:p>
           <a:p>
-            <a:pPr marL="548640" indent="-411120">
+            <a:pPr marL="548640" indent="-410400">
               <a:lnSpc>
                 <a:spcPct val="100000"/>
               </a:lnSpc>
@@ -4556,22 +4198,23 @@
                   </a:solidFill>
                 </a:uFill>
                 <a:latin typeface="Book Antiqua"/>
+                <a:ea typeface="DejaVu Sans"/>
               </a:rPr>
-              <a:t> </a:t>
+              <a:t>p(c_s) prod{p(x_i|c_s)^x_i} </a:t>
             </a:r>
             <a:endParaRPr/>
           </a:p>
           <a:p>
-            <a:pPr marL="548640" indent="-411120">
+            <a:pPr lvl="1" marL="864000" indent="-323280">
               <a:lnSpc>
                 <a:spcPct val="100000"/>
               </a:lnSpc>
               <a:buClr>
-                <a:srgbClr val="f9f9f9"/>
+                <a:srgbClr val="ffffff"/>
               </a:buClr>
-              <a:buSzPct val="65000"/>
-              <a:buFont typeface="Wingdings 2" charset="2"/>
-              <a:buChar char=""/>
+              <a:buSzPct val="75000"/>
+              <a:buFont typeface="Wingdings" charset="2"/>
+              <a:buChar char=""/>
             </a:pPr>
             <a:r>
               <a:rPr lang="en-US" sz="2800" spc="-1" strike="noStrike">
@@ -4584,19 +4227,23 @@
                   </a:solidFill>
                 </a:uFill>
                 <a:latin typeface="Book Antiqua"/>
+                <a:ea typeface="DejaVu Sans"/>
               </a:rPr>
-              <a:t>p(c_s) prod{p(x_i|c_s)^x_i </a:t>
+              <a:t>&gt; p(c_h) prod{p(x_i|c_h)^x_i},</a:t>
             </a:r>
             <a:endParaRPr/>
           </a:p>
           <a:p>
-            <a:pPr lvl="1" marL="864000" indent="-324000">
+            <a:pPr lvl="1" marL="864000" indent="-323280">
+              <a:lnSpc>
+                <a:spcPct val="100000"/>
+              </a:lnSpc>
               <a:buClr>
                 <a:srgbClr val="ffffff"/>
               </a:buClr>
               <a:buSzPct val="75000"/>
-              <a:buFont typeface="StarSymbol"/>
-              <a:buChar char=""/>
+              <a:buFont typeface="Wingdings" charset="2"/>
+              <a:buChar char=""/>
             </a:pPr>
             <a:r>
               <a:rPr lang="en-US" sz="2800" spc="-1" strike="noStrike">
@@ -4609,19 +4256,23 @@
                   </a:solidFill>
                 </a:uFill>
                 <a:latin typeface="Book Antiqua"/>
+                <a:ea typeface="DejaVu Sans"/>
               </a:rPr>
-              <a:t>&gt; p(c_h) prod{p(x_i|c_h)^x_i,</a:t>
+              <a:t> </a:t>
             </a:r>
             <a:endParaRPr/>
           </a:p>
           <a:p>
-            <a:pPr lvl="1" marL="864000" indent="-324000">
+            <a:pPr lvl="1" marL="864000" indent="-323280">
+              <a:lnSpc>
+                <a:spcPct val="100000"/>
+              </a:lnSpc>
               <a:buClr>
                 <a:srgbClr val="ffffff"/>
               </a:buClr>
               <a:buSzPct val="75000"/>
-              <a:buFont typeface="StarSymbol"/>
-              <a:buChar char=""/>
+              <a:buFont typeface="Wingdings" charset="2"/>
+              <a:buChar char=""/>
             </a:pPr>
             <a:r>
               <a:rPr lang="en-US" sz="2800" spc="-1" strike="noStrike">
@@ -4634,83 +4285,9 @@
                   </a:solidFill>
                 </a:uFill>
                 <a:latin typeface="Book Antiqua"/>
-              </a:rPr>
-              <a:t> </a:t>
-            </a:r>
-            <a:endParaRPr/>
-          </a:p>
-          <a:p>
-            <a:pPr lvl="1" marL="864000" indent="-324000">
-              <a:buClr>
-                <a:srgbClr val="ffffff"/>
-              </a:buClr>
-              <a:buSzPct val="75000"/>
-              <a:buFont typeface="StarSymbol"/>
-              <a:buChar char=""/>
-            </a:pPr>
-            <a:r>
-              <a:rPr lang="en-US" sz="2800" spc="-1" strike="noStrike">
-                <a:solidFill>
-                  <a:srgbClr val="ffffff"/>
-                </a:solidFill>
-                <a:uFill>
-                  <a:solidFill>
-                    <a:srgbClr val="ffffff"/>
-                  </a:solidFill>
-                </a:uFill>
-                <a:latin typeface="Book Antiqua"/>
+                <a:ea typeface="DejaVu Sans"/>
               </a:rPr>
               <a:t>where p(x_i|c) = (1 + N_{x_i,c})/(m+N_c).</a:t>
-            </a:r>
-            <a:endParaRPr/>
-          </a:p>
-          <a:p>
-            <a:pPr lvl="1" marL="864000" indent="-324000">
-              <a:buClr>
-                <a:srgbClr val="ffffff"/>
-              </a:buClr>
-              <a:buSzPct val="75000"/>
-              <a:buFont typeface="StarSymbol"/>
-              <a:buChar char=""/>
-            </a:pPr>
-            <a:r>
-              <a:rPr lang="en-US" sz="2800" spc="-1" strike="noStrike">
-                <a:solidFill>
-                  <a:srgbClr val="ffffff"/>
-                </a:solidFill>
-                <a:uFill>
-                  <a:solidFill>
-                    <a:srgbClr val="ffffff"/>
-                  </a:solidFill>
-                </a:uFill>
-                <a:latin typeface="Book Antiqua"/>
-              </a:rPr>
-              <a:t> </a:t>
-            </a:r>
-            <a:endParaRPr/>
-          </a:p>
-          <a:p>
-            <a:pPr lvl="1" marL="864000" indent="-324000">
-              <a:buClr>
-                <a:srgbClr val="ffffff"/>
-              </a:buClr>
-              <a:buSzPct val="75000"/>
-              <a:buFont typeface="StarSymbol"/>
-              <a:buChar char=""/>
-            </a:pPr>
-            <a:r>
-              <a:rPr lang="en-US" sz="2800" spc="-1" strike="noStrike">
-                <a:solidFill>
-                  <a:srgbClr val="ffffff"/>
-                </a:solidFill>
-                <a:uFill>
-                  <a:solidFill>
-                    <a:srgbClr val="ffffff"/>
-                  </a:solidFill>
-                </a:uFill>
-                <a:latin typeface="Book Antiqua"/>
-              </a:rPr>
-              <a:t> </a:t>
             </a:r>
             <a:endParaRPr/>
           </a:p>
@@ -4767,14 +4344,14 @@
       </p:grpSpPr>
       <p:sp>
         <p:nvSpPr>
-          <p:cNvPr id="95" name="TextShape 1"/>
-          <p:cNvSpPr txBox="1"/>
+          <p:cNvPr id="88" name="CustomShape 1"/>
+          <p:cNvSpPr/>
           <p:nvPr/>
         </p:nvSpPr>
         <p:spPr>
           <a:xfrm>
             <a:off x="457200" y="274680"/>
-            <a:ext cx="8229240" cy="1142640"/>
+            <a:ext cx="8228520" cy="1141920"/>
           </a:xfrm>
           <a:prstGeom prst="rect">
             <a:avLst/>
@@ -4784,6 +4361,12 @@
             <a:noFill/>
           </a:ln>
         </p:spPr>
+        <p:style>
+          <a:lnRef idx="0"/>
+          <a:fillRef idx="0"/>
+          <a:effectRef idx="0"/>
+          <a:fontRef idx="minor"/>
+        </p:style>
         <p:txBody>
           <a:bodyPr lIns="90000" rIns="90000" tIns="45000" bIns="45000" anchor="ctr"/>
           <a:p>
@@ -4803,8 +4386,9 @@
                   </a:solidFill>
                 </a:uFill>
                 <a:latin typeface="Lucida Sans"/>
+                <a:ea typeface="DejaVu Sans"/>
               </a:rPr>
-              <a:t>Results</a:t>
+              <a:t>Demonstration and Results</a:t>
             </a:r>
             <a:endParaRPr/>
           </a:p>
@@ -4812,14 +4396,14 @@
       </p:sp>
       <p:sp>
         <p:nvSpPr>
-          <p:cNvPr id="96" name="TextShape 2"/>
-          <p:cNvSpPr txBox="1"/>
+          <p:cNvPr id="89" name="CustomShape 2"/>
+          <p:cNvSpPr/>
           <p:nvPr/>
         </p:nvSpPr>
         <p:spPr>
           <a:xfrm>
             <a:off x="457200" y="1600200"/>
-            <a:ext cx="8229240" cy="4708800"/>
+            <a:ext cx="8228520" cy="4708080"/>
           </a:xfrm>
           <a:prstGeom prst="rect">
             <a:avLst/>
@@ -4829,269 +4413,12 @@
             <a:noFill/>
           </a:ln>
         </p:spPr>
-        <p:txBody>
-          <a:bodyPr lIns="90000" rIns="90000" tIns="45000" bIns="45000"/>
-          <a:p>
-            <a:pPr marL="548640" indent="-411120">
-              <a:lnSpc>
-                <a:spcPct val="100000"/>
-              </a:lnSpc>
-              <a:buClr>
-                <a:srgbClr val="f9f9f9"/>
-              </a:buClr>
-              <a:buSzPct val="65000"/>
-              <a:buFont typeface="Wingdings 2" charset="2"/>
-              <a:buChar char=""/>
-            </a:pPr>
-            <a:r>
-              <a:rPr lang="en-US" sz="2800" spc="-1" strike="noStrike">
-                <a:solidFill>
-                  <a:srgbClr val="ffffff"/>
-                </a:solidFill>
-                <a:uFill>
-                  <a:solidFill>
-                    <a:srgbClr val="ffffff"/>
-                  </a:solidFill>
-                </a:uFill>
-                <a:latin typeface="Book Antiqua"/>
-              </a:rPr>
-              <a:t>After training on the entire 33000 emails in Enron, here's the performance at looking at a subset of Ling.</a:t>
-            </a:r>
-            <a:endParaRPr/>
-          </a:p>
-          <a:p>
-            <a:pPr marL="548640" indent="-411120">
-              <a:lnSpc>
-                <a:spcPct val="100000"/>
-              </a:lnSpc>
-              <a:buClr>
-                <a:srgbClr val="f9f9f9"/>
-              </a:buClr>
-              <a:buSzPct val="65000"/>
-              <a:buFont typeface="Wingdings 2" charset="2"/>
-              <a:buChar char=""/>
-            </a:pPr>
-            <a:r>
-              <a:rPr lang="en-US" sz="2800" spc="-1" strike="noStrike">
-                <a:solidFill>
-                  <a:srgbClr val="ffffff"/>
-                </a:solidFill>
-                <a:uFill>
-                  <a:solidFill>
-                    <a:srgbClr val="ffffff"/>
-                  </a:solidFill>
-                </a:uFill>
-                <a:latin typeface="Book Antiqua"/>
-              </a:rPr>
-              <a:t>Spam: 0.8958333333333334</a:t>
-            </a:r>
-            <a:endParaRPr/>
-          </a:p>
-          <a:p>
-            <a:pPr marL="548640" indent="-411120">
-              <a:lnSpc>
-                <a:spcPct val="100000"/>
-              </a:lnSpc>
-              <a:buClr>
-                <a:srgbClr val="f9f9f9"/>
-              </a:buClr>
-              <a:buSzPct val="65000"/>
-              <a:buFont typeface="Wingdings 2" charset="2"/>
-              <a:buChar char=""/>
-            </a:pPr>
-            <a:r>
-              <a:rPr lang="en-US" sz="2800" spc="-1" strike="noStrike">
-                <a:solidFill>
-                  <a:srgbClr val="ffffff"/>
-                </a:solidFill>
-                <a:uFill>
-                  <a:solidFill>
-                    <a:srgbClr val="ffffff"/>
-                  </a:solidFill>
-                </a:uFill>
-                <a:latin typeface="Book Antiqua"/>
-              </a:rPr>
-              <a:t>Ham:  0.8672199170124482</a:t>
-            </a:r>
-            <a:endParaRPr/>
-          </a:p>
-          <a:p>
-            <a:pPr marL="548640" indent="-411120">
-              <a:lnSpc>
-                <a:spcPct val="100000"/>
-              </a:lnSpc>
-              <a:buClr>
-                <a:srgbClr val="f9f9f9"/>
-              </a:buClr>
-              <a:buSzPct val="65000"/>
-              <a:buFont typeface="Wingdings 2" charset="2"/>
-              <a:buChar char=""/>
-            </a:pPr>
-            <a:r>
-              <a:rPr lang="en-US" sz="2800" spc="-1" strike="noStrike">
-                <a:solidFill>
-                  <a:srgbClr val="ffffff"/>
-                </a:solidFill>
-                <a:uFill>
-                  <a:solidFill>
-                    <a:srgbClr val="ffffff"/>
-                  </a:solidFill>
-                </a:uFill>
-                <a:latin typeface="Book Antiqua"/>
-              </a:rPr>
-              <a:t>It adapts fairly quickly, however, after only looking at about 300 of the Ling corpus.  The results on the same Ling subset afterwards are:</a:t>
-            </a:r>
-            <a:endParaRPr/>
-          </a:p>
-          <a:p>
-            <a:pPr marL="548640" indent="-411120">
-              <a:lnSpc>
-                <a:spcPct val="100000"/>
-              </a:lnSpc>
-              <a:buClr>
-                <a:srgbClr val="f9f9f9"/>
-              </a:buClr>
-              <a:buSzPct val="65000"/>
-              <a:buFont typeface="Wingdings 2" charset="2"/>
-              <a:buChar char=""/>
-            </a:pPr>
-            <a:r>
-              <a:rPr lang="en-US" sz="2800" spc="-1" strike="noStrike">
-                <a:solidFill>
-                  <a:srgbClr val="ffffff"/>
-                </a:solidFill>
-                <a:uFill>
-                  <a:solidFill>
-                    <a:srgbClr val="ffffff"/>
-                  </a:solidFill>
-                </a:uFill>
-                <a:latin typeface="Book Antiqua"/>
-              </a:rPr>
-              <a:t>Spam: 0.9166666666666666</a:t>
-            </a:r>
-            <a:endParaRPr/>
-          </a:p>
-          <a:p>
-            <a:pPr marL="548640" indent="-411120">
-              <a:lnSpc>
-                <a:spcPct val="100000"/>
-              </a:lnSpc>
-              <a:buClr>
-                <a:srgbClr val="f9f9f9"/>
-              </a:buClr>
-              <a:buSzPct val="65000"/>
-              <a:buFont typeface="Wingdings 2" charset="2"/>
-              <a:buChar char=""/>
-            </a:pPr>
-            <a:r>
-              <a:rPr lang="en-US" sz="2800" spc="-1" strike="noStrike">
-                <a:solidFill>
-                  <a:srgbClr val="ffffff"/>
-                </a:solidFill>
-                <a:uFill>
-                  <a:solidFill>
-                    <a:srgbClr val="ffffff"/>
-                  </a:solidFill>
-                </a:uFill>
-                <a:latin typeface="Book Antiqua"/>
-              </a:rPr>
-              <a:t>Ham:  0.9543568464730291</a:t>
-            </a:r>
-            <a:endParaRPr/>
-          </a:p>
-          <a:p>
-            <a:pPr marL="548640" indent="-411120">
-              <a:lnSpc>
-                <a:spcPct val="100000"/>
-              </a:lnSpc>
-              <a:buClr>
-                <a:srgbClr val="f9f9f9"/>
-              </a:buClr>
-              <a:buSzPct val="65000"/>
-              <a:buFont typeface="Wingdings 2" charset="2"/>
-              <a:buChar char=""/>
-            </a:pPr>
-            <a:r>
-              <a:rPr lang="en-US" sz="2800" spc="-1" strike="noStrike">
-                <a:solidFill>
-                  <a:srgbClr val="ffffff"/>
-                </a:solidFill>
-                <a:uFill>
-                  <a:solidFill>
-                    <a:srgbClr val="ffffff"/>
-                  </a:solidFill>
-                </a:uFill>
-                <a:latin typeface="Book Antiqua"/>
-              </a:rPr>
-              <a:t>And after training on both entire Enron and Ling corpuses (2900), we get almost perfect results after only a few additional emails.</a:t>
-            </a:r>
-            <a:endParaRPr/>
-          </a:p>
-          <a:p>
-            <a:pPr marL="548640" indent="-411120">
-              <a:lnSpc>
-                <a:spcPct val="100000"/>
-              </a:lnSpc>
-              <a:buClr>
-                <a:srgbClr val="f9f9f9"/>
-              </a:buClr>
-              <a:buSzPct val="65000"/>
-              <a:buFont typeface="Wingdings 2" charset="2"/>
-              <a:buChar char=""/>
-            </a:pPr>
-            <a:r>
-              <a:rPr lang="en-US" sz="2800" spc="-1" strike="noStrike">
-                <a:solidFill>
-                  <a:srgbClr val="ffffff"/>
-                </a:solidFill>
-                <a:uFill>
-                  <a:solidFill>
-                    <a:srgbClr val="ffffff"/>
-                  </a:solidFill>
-                </a:uFill>
-                <a:latin typeface="Book Antiqua"/>
-              </a:rPr>
-              <a:t>Spam: 0.9791666666666666</a:t>
-            </a:r>
-            <a:endParaRPr/>
-          </a:p>
-          <a:p>
-            <a:pPr marL="548640" indent="-411120">
-              <a:lnSpc>
-                <a:spcPct val="100000"/>
-              </a:lnSpc>
-              <a:buClr>
-                <a:srgbClr val="f9f9f9"/>
-              </a:buClr>
-              <a:buSzPct val="65000"/>
-              <a:buFont typeface="Wingdings 2" charset="2"/>
-              <a:buChar char=""/>
-            </a:pPr>
-            <a:r>
-              <a:rPr lang="en-US" sz="2800" spc="-1" strike="noStrike">
-                <a:solidFill>
-                  <a:srgbClr val="ffffff"/>
-                </a:solidFill>
-                <a:uFill>
-                  <a:solidFill>
-                    <a:srgbClr val="ffffff"/>
-                  </a:solidFill>
-                </a:uFill>
-                <a:latin typeface="Book Antiqua"/>
-              </a:rPr>
-              <a:t>Ham:  0.995850622406639</a:t>
-            </a:r>
-            <a:endParaRPr/>
-          </a:p>
-          <a:p>
-            <a:pPr>
-              <a:lnSpc>
-                <a:spcPct val="100000"/>
-              </a:lnSpc>
-            </a:pPr>
-            <a:endParaRPr/>
-          </a:p>
-        </p:txBody>
+        <p:style>
+          <a:lnRef idx="0"/>
+          <a:fillRef idx="0"/>
+          <a:effectRef idx="0"/>
+          <a:fontRef idx="minor"/>
+        </p:style>
       </p:sp>
     </p:spTree>
   </p:cSld>

</xml_diff>